<commit_message>
Revised the figure for the models of hiring & output the new `png` figure.
Made a number of changes to the document based on comments by DI.  Added some extra references, used the Choi & Pak paper's definitions of Inter/Multi & Transdisciplinary.  I like the 2+2 model.

Still have a hanging paragraph in front of the Methods section.

A set of changes related to standardizing the case of Ecolog.  Trying to fill in the discussion, left another hanging paragraph.
</commit_message>
<xml_diff>
--- a/Inter_Model.pptx
+++ b/Inter_Model.pptx
@@ -104,6 +104,11 @@
       </a:defRPr>
     </a:lvl9pPr>
   </p:defaultTextStyle>
+  <p:extLst>
+    <p:ext uri="{EFAFB233-063F-42B5-8137-9DF3F51BA10A}">
+      <p15:sldGuideLst xmlns:p15="http://schemas.microsoft.com/office/powerpoint/2012/main"/>
+    </p:ext>
+  </p:extLst>
 </p:presentation>
 </file>
 
@@ -238,7 +243,7 @@
           <a:p>
             <a:fld id="{05B394FA-01C8-4318-9131-DFED4A6D8914}" type="datetimeFigureOut">
               <a:rPr lang="en-CA" smtClean="0"/>
-              <a:t>25/11/2015</a:t>
+              <a:t>2016-01-03</a:t>
             </a:fld>
             <a:endParaRPr lang="en-CA"/>
           </a:p>
@@ -408,7 +413,7 @@
           <a:p>
             <a:fld id="{05B394FA-01C8-4318-9131-DFED4A6D8914}" type="datetimeFigureOut">
               <a:rPr lang="en-CA" smtClean="0"/>
-              <a:t>25/11/2015</a:t>
+              <a:t>2016-01-03</a:t>
             </a:fld>
             <a:endParaRPr lang="en-CA"/>
           </a:p>
@@ -588,7 +593,7 @@
           <a:p>
             <a:fld id="{05B394FA-01C8-4318-9131-DFED4A6D8914}" type="datetimeFigureOut">
               <a:rPr lang="en-CA" smtClean="0"/>
-              <a:t>25/11/2015</a:t>
+              <a:t>2016-01-03</a:t>
             </a:fld>
             <a:endParaRPr lang="en-CA"/>
           </a:p>
@@ -758,7 +763,7 @@
           <a:p>
             <a:fld id="{05B394FA-01C8-4318-9131-DFED4A6D8914}" type="datetimeFigureOut">
               <a:rPr lang="en-CA" smtClean="0"/>
-              <a:t>25/11/2015</a:t>
+              <a:t>2016-01-03</a:t>
             </a:fld>
             <a:endParaRPr lang="en-CA"/>
           </a:p>
@@ -1004,7 +1009,7 @@
           <a:p>
             <a:fld id="{05B394FA-01C8-4318-9131-DFED4A6D8914}" type="datetimeFigureOut">
               <a:rPr lang="en-CA" smtClean="0"/>
-              <a:t>25/11/2015</a:t>
+              <a:t>2016-01-03</a:t>
             </a:fld>
             <a:endParaRPr lang="en-CA"/>
           </a:p>
@@ -1236,7 +1241,7 @@
           <a:p>
             <a:fld id="{05B394FA-01C8-4318-9131-DFED4A6D8914}" type="datetimeFigureOut">
               <a:rPr lang="en-CA" smtClean="0"/>
-              <a:t>25/11/2015</a:t>
+              <a:t>2016-01-03</a:t>
             </a:fld>
             <a:endParaRPr lang="en-CA"/>
           </a:p>
@@ -1603,7 +1608,7 @@
           <a:p>
             <a:fld id="{05B394FA-01C8-4318-9131-DFED4A6D8914}" type="datetimeFigureOut">
               <a:rPr lang="en-CA" smtClean="0"/>
-              <a:t>25/11/2015</a:t>
+              <a:t>2016-01-03</a:t>
             </a:fld>
             <a:endParaRPr lang="en-CA"/>
           </a:p>
@@ -1721,7 +1726,7 @@
           <a:p>
             <a:fld id="{05B394FA-01C8-4318-9131-DFED4A6D8914}" type="datetimeFigureOut">
               <a:rPr lang="en-CA" smtClean="0"/>
-              <a:t>25/11/2015</a:t>
+              <a:t>2016-01-03</a:t>
             </a:fld>
             <a:endParaRPr lang="en-CA"/>
           </a:p>
@@ -1816,7 +1821,7 @@
           <a:p>
             <a:fld id="{05B394FA-01C8-4318-9131-DFED4A6D8914}" type="datetimeFigureOut">
               <a:rPr lang="en-CA" smtClean="0"/>
-              <a:t>25/11/2015</a:t>
+              <a:t>2016-01-03</a:t>
             </a:fld>
             <a:endParaRPr lang="en-CA"/>
           </a:p>
@@ -2093,7 +2098,7 @@
           <a:p>
             <a:fld id="{05B394FA-01C8-4318-9131-DFED4A6D8914}" type="datetimeFigureOut">
               <a:rPr lang="en-CA" smtClean="0"/>
-              <a:t>25/11/2015</a:t>
+              <a:t>2016-01-03</a:t>
             </a:fld>
             <a:endParaRPr lang="en-CA"/>
           </a:p>
@@ -2346,7 +2351,7 @@
           <a:p>
             <a:fld id="{05B394FA-01C8-4318-9131-DFED4A6D8914}" type="datetimeFigureOut">
               <a:rPr lang="en-CA" smtClean="0"/>
-              <a:t>25/11/2015</a:t>
+              <a:t>2016-01-03</a:t>
             </a:fld>
             <a:endParaRPr lang="en-CA"/>
           </a:p>
@@ -2559,7 +2564,7 @@
           <a:p>
             <a:fld id="{05B394FA-01C8-4318-9131-DFED4A6D8914}" type="datetimeFigureOut">
               <a:rPr lang="en-CA" smtClean="0"/>
-              <a:t>25/11/2015</a:t>
+              <a:t>2016-01-03</a:t>
             </a:fld>
             <a:endParaRPr lang="en-CA"/>
           </a:p>
@@ -2964,1629 +2969,686 @@
           <a:chExt cx="0" cy="0"/>
         </a:xfrm>
       </p:grpSpPr>
-      <p:grpSp>
-        <p:nvGrpSpPr>
-          <p:cNvPr id="115" name="Group 114"/>
-          <p:cNvGrpSpPr/>
-          <p:nvPr/>
-        </p:nvGrpSpPr>
-        <p:grpSpPr>
+      <p:sp>
+        <p:nvSpPr>
+          <p:cNvPr id="31" name="Oval 30"/>
+          <p:cNvSpPr/>
+          <p:nvPr/>
+        </p:nvSpPr>
+        <p:spPr>
           <a:xfrm>
-            <a:off x="837782" y="2057693"/>
-            <a:ext cx="2241997" cy="2104559"/>
-            <a:chOff x="837782" y="2057693"/>
-            <a:chExt cx="2241997" cy="2104559"/>
-          </a:xfrm>
-        </p:grpSpPr>
-        <p:sp>
-          <p:nvSpPr>
-            <p:cNvPr id="4" name="Oval 3"/>
-            <p:cNvSpPr/>
-            <p:nvPr/>
-          </p:nvSpPr>
-          <p:spPr>
-            <a:xfrm>
-              <a:off x="837782" y="2057693"/>
-              <a:ext cx="643944" cy="643944"/>
-            </a:xfrm>
-            <a:prstGeom prst="ellipse">
-              <a:avLst/>
-            </a:prstGeom>
-          </p:spPr>
-          <p:style>
-            <a:lnRef idx="2">
-              <a:schemeClr val="accent1">
-                <a:shade val="50000"/>
-              </a:schemeClr>
-            </a:lnRef>
-            <a:fillRef idx="1">
-              <a:schemeClr val="accent1"/>
-            </a:fillRef>
-            <a:effectRef idx="0">
-              <a:schemeClr val="accent1"/>
-            </a:effectRef>
-            <a:fontRef idx="minor">
-              <a:schemeClr val="lt1"/>
-            </a:fontRef>
-          </p:style>
-          <p:txBody>
-            <a:bodyPr rtlCol="0" anchor="ctr"/>
-            <a:lstStyle/>
-            <a:p>
-              <a:pPr algn="ctr"/>
-              <a:endParaRPr lang="en-CA"/>
-            </a:p>
-          </p:txBody>
-        </p:sp>
-        <p:sp>
-          <p:nvSpPr>
-            <p:cNvPr id="5" name="Oval 4"/>
-            <p:cNvSpPr/>
-            <p:nvPr/>
-          </p:nvSpPr>
-          <p:spPr>
-            <a:xfrm>
-              <a:off x="1636273" y="2057693"/>
-              <a:ext cx="643944" cy="643944"/>
-            </a:xfrm>
-            <a:prstGeom prst="ellipse">
-              <a:avLst/>
-            </a:prstGeom>
-          </p:spPr>
-          <p:style>
-            <a:lnRef idx="2">
-              <a:schemeClr val="accent1">
-                <a:shade val="50000"/>
-              </a:schemeClr>
-            </a:lnRef>
-            <a:fillRef idx="1">
-              <a:schemeClr val="accent1"/>
-            </a:fillRef>
-            <a:effectRef idx="0">
-              <a:schemeClr val="accent1"/>
-            </a:effectRef>
-            <a:fontRef idx="minor">
-              <a:schemeClr val="lt1"/>
-            </a:fontRef>
-          </p:style>
-          <p:txBody>
-            <a:bodyPr rtlCol="0" anchor="ctr"/>
-            <a:lstStyle/>
-            <a:p>
-              <a:pPr algn="ctr"/>
-              <a:endParaRPr lang="en-CA"/>
-            </a:p>
-          </p:txBody>
-        </p:sp>
-        <p:sp>
-          <p:nvSpPr>
-            <p:cNvPr id="6" name="Oval 5"/>
-            <p:cNvSpPr/>
-            <p:nvPr/>
-          </p:nvSpPr>
-          <p:spPr>
-            <a:xfrm>
-              <a:off x="2434764" y="2057693"/>
-              <a:ext cx="643944" cy="643944"/>
-            </a:xfrm>
-            <a:prstGeom prst="ellipse">
-              <a:avLst/>
-            </a:prstGeom>
-          </p:spPr>
-          <p:style>
-            <a:lnRef idx="2">
-              <a:schemeClr val="accent1">
-                <a:shade val="50000"/>
-              </a:schemeClr>
-            </a:lnRef>
-            <a:fillRef idx="1">
-              <a:schemeClr val="accent1"/>
-            </a:fillRef>
-            <a:effectRef idx="0">
-              <a:schemeClr val="accent1"/>
-            </a:effectRef>
-            <a:fontRef idx="minor">
-              <a:schemeClr val="lt1"/>
-            </a:fontRef>
-          </p:style>
-          <p:txBody>
-            <a:bodyPr rtlCol="0" anchor="ctr"/>
-            <a:lstStyle/>
-            <a:p>
-              <a:pPr algn="ctr"/>
-              <a:endParaRPr lang="en-CA"/>
-            </a:p>
-          </p:txBody>
-        </p:sp>
-        <p:sp>
-          <p:nvSpPr>
-            <p:cNvPr id="8" name="Rectangle 7"/>
-            <p:cNvSpPr/>
-            <p:nvPr/>
-          </p:nvSpPr>
-          <p:spPr>
-            <a:xfrm>
-              <a:off x="1701203" y="3264792"/>
-              <a:ext cx="515155" cy="515155"/>
-            </a:xfrm>
-            <a:prstGeom prst="rect">
-              <a:avLst/>
-            </a:prstGeom>
-          </p:spPr>
-          <p:style>
-            <a:lnRef idx="2">
-              <a:schemeClr val="accent1">
-                <a:shade val="50000"/>
-              </a:schemeClr>
-            </a:lnRef>
-            <a:fillRef idx="1">
-              <a:schemeClr val="accent1"/>
-            </a:fillRef>
-            <a:effectRef idx="0">
-              <a:schemeClr val="accent1"/>
-            </a:effectRef>
-            <a:fontRef idx="minor">
-              <a:schemeClr val="lt1"/>
-            </a:fontRef>
-          </p:style>
-          <p:txBody>
-            <a:bodyPr rtlCol="0" anchor="ctr"/>
-            <a:lstStyle/>
-            <a:p>
-              <a:pPr algn="ctr"/>
-              <a:endParaRPr lang="en-CA"/>
-            </a:p>
-          </p:txBody>
-        </p:sp>
-        <p:cxnSp>
-          <p:nvCxnSpPr>
-            <p:cNvPr id="11" name="Straight Arrow Connector 10"/>
-            <p:cNvCxnSpPr>
-              <a:stCxn id="5" idx="4"/>
-              <a:endCxn id="8" idx="0"/>
-            </p:cNvCxnSpPr>
-            <p:nvPr/>
-          </p:nvCxnSpPr>
-          <p:spPr>
-            <a:xfrm>
-              <a:off x="1958245" y="2701637"/>
-              <a:ext cx="536" cy="563155"/>
-            </a:xfrm>
-            <a:prstGeom prst="straightConnector1">
-              <a:avLst/>
-            </a:prstGeom>
-            <a:ln w="34925">
-              <a:tailEnd type="triangle"/>
-            </a:ln>
-          </p:spPr>
-          <p:style>
-            <a:lnRef idx="1">
-              <a:schemeClr val="accent1"/>
-            </a:lnRef>
-            <a:fillRef idx="0">
-              <a:schemeClr val="accent1"/>
-            </a:fillRef>
-            <a:effectRef idx="0">
-              <a:schemeClr val="accent1"/>
-            </a:effectRef>
-            <a:fontRef idx="minor">
-              <a:schemeClr val="tx1"/>
-            </a:fontRef>
-          </p:style>
-        </p:cxnSp>
-        <p:cxnSp>
-          <p:nvCxnSpPr>
-            <p:cNvPr id="13" name="Straight Arrow Connector 12"/>
-            <p:cNvCxnSpPr>
-              <a:stCxn id="4" idx="4"/>
-              <a:endCxn id="31" idx="0"/>
-            </p:cNvCxnSpPr>
-            <p:nvPr/>
-          </p:nvCxnSpPr>
-          <p:spPr>
-            <a:xfrm>
-              <a:off x="1159754" y="2701637"/>
-              <a:ext cx="0" cy="816671"/>
-            </a:xfrm>
-            <a:prstGeom prst="straightConnector1">
-              <a:avLst/>
-            </a:prstGeom>
-            <a:ln w="34925">
-              <a:tailEnd type="triangle"/>
-            </a:ln>
-          </p:spPr>
-          <p:style>
-            <a:lnRef idx="1">
-              <a:schemeClr val="accent1"/>
-            </a:lnRef>
-            <a:fillRef idx="0">
-              <a:schemeClr val="accent1"/>
-            </a:fillRef>
-            <a:effectRef idx="0">
-              <a:schemeClr val="accent1"/>
-            </a:effectRef>
-            <a:fontRef idx="minor">
-              <a:schemeClr val="tx1"/>
-            </a:fontRef>
-          </p:style>
-        </p:cxnSp>
-        <p:cxnSp>
-          <p:nvCxnSpPr>
-            <p:cNvPr id="15" name="Straight Arrow Connector 14"/>
-            <p:cNvCxnSpPr>
-              <a:stCxn id="4" idx="4"/>
-              <a:endCxn id="8" idx="0"/>
-            </p:cNvCxnSpPr>
-            <p:nvPr/>
-          </p:nvCxnSpPr>
-          <p:spPr>
-            <a:xfrm>
-              <a:off x="1159754" y="2701637"/>
-              <a:ext cx="799027" cy="563155"/>
-            </a:xfrm>
-            <a:prstGeom prst="straightConnector1">
-              <a:avLst/>
-            </a:prstGeom>
-            <a:ln w="34925">
-              <a:tailEnd type="triangle"/>
-            </a:ln>
-          </p:spPr>
-          <p:style>
-            <a:lnRef idx="1">
-              <a:schemeClr val="accent1"/>
-            </a:lnRef>
-            <a:fillRef idx="0">
-              <a:schemeClr val="accent1"/>
-            </a:fillRef>
-            <a:effectRef idx="0">
-              <a:schemeClr val="accent1"/>
-            </a:effectRef>
-            <a:fontRef idx="minor">
-              <a:schemeClr val="tx1"/>
-            </a:fontRef>
-          </p:style>
-        </p:cxnSp>
-        <p:cxnSp>
-          <p:nvCxnSpPr>
-            <p:cNvPr id="17" name="Straight Arrow Connector 16"/>
-            <p:cNvCxnSpPr>
-              <a:stCxn id="6" idx="4"/>
-              <a:endCxn id="8" idx="0"/>
-            </p:cNvCxnSpPr>
-            <p:nvPr/>
-          </p:nvCxnSpPr>
-          <p:spPr>
-            <a:xfrm flipH="1">
-              <a:off x="1958781" y="2701637"/>
-              <a:ext cx="797955" cy="563155"/>
-            </a:xfrm>
-            <a:prstGeom prst="straightConnector1">
-              <a:avLst/>
-            </a:prstGeom>
-            <a:ln w="34925">
-              <a:tailEnd type="triangle"/>
-            </a:ln>
-          </p:spPr>
-          <p:style>
-            <a:lnRef idx="1">
-              <a:schemeClr val="accent1"/>
-            </a:lnRef>
-            <a:fillRef idx="0">
-              <a:schemeClr val="accent1"/>
-            </a:fillRef>
-            <a:effectRef idx="0">
-              <a:schemeClr val="accent1"/>
-            </a:effectRef>
-            <a:fontRef idx="minor">
-              <a:schemeClr val="tx1"/>
-            </a:fontRef>
-          </p:style>
-        </p:cxnSp>
-        <p:cxnSp>
-          <p:nvCxnSpPr>
-            <p:cNvPr id="19" name="Straight Arrow Connector 18"/>
-            <p:cNvCxnSpPr>
-              <a:stCxn id="6" idx="4"/>
-              <a:endCxn id="28" idx="0"/>
-            </p:cNvCxnSpPr>
-            <p:nvPr/>
-          </p:nvCxnSpPr>
-          <p:spPr>
-            <a:xfrm>
-              <a:off x="2756736" y="2701637"/>
-              <a:ext cx="1071" cy="816671"/>
-            </a:xfrm>
-            <a:prstGeom prst="straightConnector1">
-              <a:avLst/>
-            </a:prstGeom>
-            <a:ln w="34925">
-              <a:tailEnd type="triangle"/>
-            </a:ln>
-          </p:spPr>
-          <p:style>
-            <a:lnRef idx="1">
-              <a:schemeClr val="accent1"/>
-            </a:lnRef>
-            <a:fillRef idx="0">
-              <a:schemeClr val="accent1"/>
-            </a:fillRef>
-            <a:effectRef idx="0">
-              <a:schemeClr val="accent1"/>
-            </a:effectRef>
-            <a:fontRef idx="minor">
-              <a:schemeClr val="tx1"/>
-            </a:fontRef>
-          </p:style>
-        </p:cxnSp>
-        <p:cxnSp>
-          <p:nvCxnSpPr>
-            <p:cNvPr id="26" name="Elbow Connector 25"/>
-            <p:cNvCxnSpPr>
-              <a:stCxn id="28" idx="6"/>
-              <a:endCxn id="6" idx="6"/>
-            </p:cNvCxnSpPr>
-            <p:nvPr/>
-          </p:nvCxnSpPr>
-          <p:spPr>
-            <a:xfrm flipH="1" flipV="1">
-              <a:off x="3078708" y="2379665"/>
-              <a:ext cx="1071" cy="1460615"/>
-            </a:xfrm>
-            <a:prstGeom prst="bentConnector3">
-              <a:avLst>
-                <a:gd name="adj1" fmla="val -21344538"/>
-              </a:avLst>
-            </a:prstGeom>
-            <a:ln w="31750">
-              <a:solidFill>
-                <a:srgbClr val="FF0000"/>
-              </a:solidFill>
-              <a:tailEnd type="triangle"/>
-            </a:ln>
-          </p:spPr>
-          <p:style>
-            <a:lnRef idx="1">
-              <a:schemeClr val="accent1"/>
-            </a:lnRef>
-            <a:fillRef idx="0">
-              <a:schemeClr val="accent1"/>
-            </a:fillRef>
-            <a:effectRef idx="0">
-              <a:schemeClr val="accent1"/>
-            </a:effectRef>
-            <a:fontRef idx="minor">
-              <a:schemeClr val="tx1"/>
-            </a:fontRef>
-          </p:style>
-        </p:cxnSp>
-        <p:sp>
-          <p:nvSpPr>
-            <p:cNvPr id="28" name="Oval 27"/>
-            <p:cNvSpPr/>
-            <p:nvPr/>
-          </p:nvSpPr>
-          <p:spPr>
-            <a:xfrm>
-              <a:off x="2435835" y="3518308"/>
-              <a:ext cx="643944" cy="643944"/>
-            </a:xfrm>
-            <a:prstGeom prst="ellipse">
-              <a:avLst/>
-            </a:prstGeom>
-          </p:spPr>
-          <p:style>
-            <a:lnRef idx="2">
-              <a:schemeClr val="accent1">
-                <a:shade val="50000"/>
-              </a:schemeClr>
-            </a:lnRef>
-            <a:fillRef idx="1">
-              <a:schemeClr val="accent1"/>
-            </a:fillRef>
-            <a:effectRef idx="0">
-              <a:schemeClr val="accent1"/>
-            </a:effectRef>
-            <a:fontRef idx="minor">
-              <a:schemeClr val="lt1"/>
-            </a:fontRef>
-          </p:style>
-          <p:txBody>
-            <a:bodyPr rtlCol="0" anchor="ctr"/>
-            <a:lstStyle/>
-            <a:p>
-              <a:pPr algn="ctr"/>
-              <a:endParaRPr lang="en-CA"/>
-            </a:p>
-          </p:txBody>
-        </p:sp>
-        <p:sp>
-          <p:nvSpPr>
-            <p:cNvPr id="31" name="Oval 30"/>
-            <p:cNvSpPr/>
-            <p:nvPr/>
-          </p:nvSpPr>
-          <p:spPr>
-            <a:xfrm>
-              <a:off x="837782" y="3518308"/>
-              <a:ext cx="643944" cy="643944"/>
-            </a:xfrm>
-            <a:prstGeom prst="ellipse">
-              <a:avLst/>
-            </a:prstGeom>
-          </p:spPr>
-          <p:style>
-            <a:lnRef idx="2">
-              <a:schemeClr val="accent1">
-                <a:shade val="50000"/>
-              </a:schemeClr>
-            </a:lnRef>
-            <a:fillRef idx="1">
-              <a:schemeClr val="accent1"/>
-            </a:fillRef>
-            <a:effectRef idx="0">
-              <a:schemeClr val="accent1"/>
-            </a:effectRef>
-            <a:fontRef idx="minor">
-              <a:schemeClr val="lt1"/>
-            </a:fontRef>
-          </p:style>
-          <p:txBody>
-            <a:bodyPr rtlCol="0" anchor="ctr"/>
-            <a:lstStyle/>
-            <a:p>
-              <a:pPr algn="ctr"/>
-              <a:endParaRPr lang="en-CA"/>
-            </a:p>
-          </p:txBody>
-        </p:sp>
-        <p:cxnSp>
-          <p:nvCxnSpPr>
-            <p:cNvPr id="71" name="Elbow Connector 70"/>
-            <p:cNvCxnSpPr>
-              <a:stCxn id="31" idx="2"/>
-              <a:endCxn id="4" idx="2"/>
-            </p:cNvCxnSpPr>
-            <p:nvPr/>
-          </p:nvCxnSpPr>
-          <p:spPr>
-            <a:xfrm rot="10800000">
-              <a:off x="837782" y="2379666"/>
-              <a:ext cx="12700" cy="1460615"/>
-            </a:xfrm>
-            <a:prstGeom prst="bentConnector3">
-              <a:avLst>
-                <a:gd name="adj1" fmla="val 1800000"/>
-              </a:avLst>
-            </a:prstGeom>
-            <a:ln w="31750">
-              <a:solidFill>
-                <a:srgbClr val="FF0000"/>
-              </a:solidFill>
-              <a:tailEnd type="triangle"/>
-            </a:ln>
-          </p:spPr>
-          <p:style>
-            <a:lnRef idx="1">
-              <a:schemeClr val="accent1"/>
-            </a:lnRef>
-            <a:fillRef idx="0">
-              <a:schemeClr val="accent1"/>
-            </a:fillRef>
-            <a:effectRef idx="0">
-              <a:schemeClr val="accent1"/>
-            </a:effectRef>
-            <a:fontRef idx="minor">
-              <a:schemeClr val="tx1"/>
-            </a:fontRef>
-          </p:style>
-        </p:cxnSp>
-      </p:grpSp>
-      <p:grpSp>
-        <p:nvGrpSpPr>
-          <p:cNvPr id="117" name="Group 116"/>
-          <p:cNvGrpSpPr/>
-          <p:nvPr/>
-        </p:nvGrpSpPr>
-        <p:grpSpPr>
+            <a:off x="1650775" y="3504989"/>
+            <a:ext cx="643944" cy="643944"/>
+          </a:xfrm>
+          <a:prstGeom prst="ellipse">
+            <a:avLst/>
+          </a:prstGeom>
+        </p:spPr>
+        <p:style>
+          <a:lnRef idx="2">
+            <a:schemeClr val="accent1">
+              <a:shade val="50000"/>
+            </a:schemeClr>
+          </a:lnRef>
+          <a:fillRef idx="1">
+            <a:schemeClr val="accent1"/>
+          </a:fillRef>
+          <a:effectRef idx="0">
+            <a:schemeClr val="accent1"/>
+          </a:effectRef>
+          <a:fontRef idx="minor">
+            <a:schemeClr val="lt1"/>
+          </a:fontRef>
+        </p:style>
+        <p:txBody>
+          <a:bodyPr rtlCol="0" anchor="ctr"/>
+          <a:lstStyle/>
+          <a:p>
+            <a:pPr algn="ctr"/>
+            <a:endParaRPr lang="en-CA"/>
+          </a:p>
+        </p:txBody>
+      </p:sp>
+      <p:cxnSp>
+        <p:nvCxnSpPr>
+          <p:cNvPr id="75" name="Straight Arrow Connector 74"/>
+          <p:cNvCxnSpPr>
+            <a:endCxn id="94" idx="0"/>
+          </p:cNvCxnSpPr>
+          <p:nvPr/>
+        </p:nvCxnSpPr>
+        <p:spPr>
           <a:xfrm>
-            <a:off x="7621523" y="2057693"/>
-            <a:ext cx="2416932" cy="2104559"/>
-            <a:chOff x="7621523" y="2057693"/>
-            <a:chExt cx="2416932" cy="2104559"/>
-          </a:xfrm>
-        </p:grpSpPr>
-        <p:sp>
-          <p:nvSpPr>
-            <p:cNvPr id="72" name="Oval 71"/>
-            <p:cNvSpPr/>
-            <p:nvPr/>
-          </p:nvSpPr>
-          <p:spPr>
-            <a:xfrm>
-              <a:off x="8310542" y="2057693"/>
-              <a:ext cx="643944" cy="643944"/>
-            </a:xfrm>
-            <a:prstGeom prst="ellipse">
-              <a:avLst/>
-            </a:prstGeom>
-          </p:spPr>
-          <p:style>
-            <a:lnRef idx="2">
-              <a:schemeClr val="accent1">
-                <a:shade val="50000"/>
-              </a:schemeClr>
-            </a:lnRef>
-            <a:fillRef idx="1">
-              <a:schemeClr val="accent1"/>
-            </a:fillRef>
-            <a:effectRef idx="0">
-              <a:schemeClr val="accent1"/>
-            </a:effectRef>
-            <a:fontRef idx="minor">
-              <a:schemeClr val="lt1"/>
-            </a:fontRef>
-          </p:style>
-          <p:txBody>
-            <a:bodyPr rtlCol="0" anchor="ctr"/>
-            <a:lstStyle/>
-            <a:p>
-              <a:pPr algn="ctr"/>
-              <a:endParaRPr lang="en-CA"/>
-            </a:p>
-          </p:txBody>
-        </p:sp>
-        <p:sp>
-          <p:nvSpPr>
-            <p:cNvPr id="73" name="Oval 72"/>
-            <p:cNvSpPr/>
-            <p:nvPr/>
-          </p:nvSpPr>
-          <p:spPr>
-            <a:xfrm>
-              <a:off x="9128350" y="2057693"/>
-              <a:ext cx="643944" cy="643944"/>
-            </a:xfrm>
-            <a:prstGeom prst="ellipse">
-              <a:avLst/>
-            </a:prstGeom>
-          </p:spPr>
-          <p:style>
-            <a:lnRef idx="2">
-              <a:schemeClr val="accent1">
-                <a:shade val="50000"/>
-              </a:schemeClr>
-            </a:lnRef>
-            <a:fillRef idx="1">
-              <a:schemeClr val="accent1"/>
-            </a:fillRef>
-            <a:effectRef idx="0">
-              <a:schemeClr val="accent1"/>
-            </a:effectRef>
-            <a:fontRef idx="minor">
-              <a:schemeClr val="lt1"/>
-            </a:fontRef>
-          </p:style>
-          <p:txBody>
-            <a:bodyPr rtlCol="0" anchor="ctr"/>
-            <a:lstStyle/>
-            <a:p>
-              <a:pPr algn="ctr"/>
-              <a:endParaRPr lang="en-CA"/>
-            </a:p>
-          </p:txBody>
-        </p:sp>
-        <p:sp>
-          <p:nvSpPr>
-            <p:cNvPr id="74" name="Rectangle 73"/>
-            <p:cNvSpPr/>
-            <p:nvPr/>
-          </p:nvSpPr>
-          <p:spPr>
-            <a:xfrm>
-              <a:off x="7854413" y="3582703"/>
-              <a:ext cx="515155" cy="515155"/>
-            </a:xfrm>
-            <a:prstGeom prst="rect">
-              <a:avLst/>
-            </a:prstGeom>
-          </p:spPr>
-          <p:style>
-            <a:lnRef idx="2">
-              <a:schemeClr val="accent1">
-                <a:shade val="50000"/>
-              </a:schemeClr>
-            </a:lnRef>
-            <a:fillRef idx="1">
-              <a:schemeClr val="accent1"/>
-            </a:fillRef>
-            <a:effectRef idx="0">
-              <a:schemeClr val="accent1"/>
-            </a:effectRef>
-            <a:fontRef idx="minor">
-              <a:schemeClr val="lt1"/>
-            </a:fontRef>
-          </p:style>
-          <p:txBody>
-            <a:bodyPr rtlCol="0" anchor="ctr"/>
-            <a:lstStyle/>
-            <a:p>
-              <a:pPr algn="ctr"/>
-              <a:endParaRPr lang="en-CA"/>
-            </a:p>
-          </p:txBody>
-        </p:sp>
-        <p:cxnSp>
-          <p:nvCxnSpPr>
-            <p:cNvPr id="75" name="Straight Arrow Connector 74"/>
-            <p:cNvCxnSpPr>
-              <a:stCxn id="83" idx="2"/>
-              <a:endCxn id="74" idx="0"/>
-            </p:cNvCxnSpPr>
-            <p:nvPr/>
-          </p:nvCxnSpPr>
-          <p:spPr>
-            <a:xfrm>
-              <a:off x="7879101" y="2637243"/>
-              <a:ext cx="232890" cy="945460"/>
-            </a:xfrm>
-            <a:prstGeom prst="straightConnector1">
-              <a:avLst/>
-            </a:prstGeom>
-            <a:ln w="34925">
-              <a:tailEnd type="triangle"/>
-            </a:ln>
-          </p:spPr>
-          <p:style>
-            <a:lnRef idx="1">
-              <a:schemeClr val="accent1"/>
-            </a:lnRef>
-            <a:fillRef idx="0">
-              <a:schemeClr val="accent1"/>
-            </a:fillRef>
-            <a:effectRef idx="0">
-              <a:schemeClr val="accent1"/>
-            </a:effectRef>
-            <a:fontRef idx="minor">
-              <a:schemeClr val="tx1"/>
-            </a:fontRef>
-          </p:style>
-        </p:cxnSp>
-        <p:cxnSp>
-          <p:nvCxnSpPr>
-            <p:cNvPr id="76" name="Straight Arrow Connector 75"/>
-            <p:cNvCxnSpPr>
-              <a:stCxn id="72" idx="4"/>
-              <a:endCxn id="85" idx="0"/>
-            </p:cNvCxnSpPr>
-            <p:nvPr/>
-          </p:nvCxnSpPr>
-          <p:spPr>
-            <a:xfrm>
-              <a:off x="8632514" y="2701637"/>
-              <a:ext cx="249526" cy="881066"/>
-            </a:xfrm>
-            <a:prstGeom prst="straightConnector1">
-              <a:avLst/>
-            </a:prstGeom>
-            <a:ln w="34925">
-              <a:tailEnd type="triangle"/>
-            </a:ln>
-          </p:spPr>
-          <p:style>
-            <a:lnRef idx="1">
-              <a:schemeClr val="accent1"/>
-            </a:lnRef>
-            <a:fillRef idx="0">
-              <a:schemeClr val="accent1"/>
-            </a:fillRef>
-            <a:effectRef idx="0">
-              <a:schemeClr val="accent1"/>
-            </a:effectRef>
-            <a:fontRef idx="minor">
-              <a:schemeClr val="tx1"/>
-            </a:fontRef>
-          </p:style>
-        </p:cxnSp>
-        <p:cxnSp>
-          <p:nvCxnSpPr>
-            <p:cNvPr id="77" name="Straight Arrow Connector 76"/>
-            <p:cNvCxnSpPr>
-              <a:stCxn id="72" idx="4"/>
-              <a:endCxn id="74" idx="0"/>
-            </p:cNvCxnSpPr>
-            <p:nvPr/>
-          </p:nvCxnSpPr>
-          <p:spPr>
-            <a:xfrm flipH="1">
-              <a:off x="8111991" y="2701637"/>
-              <a:ext cx="520523" cy="881066"/>
-            </a:xfrm>
-            <a:prstGeom prst="straightConnector1">
-              <a:avLst/>
-            </a:prstGeom>
-            <a:ln w="34925">
-              <a:tailEnd type="triangle"/>
-            </a:ln>
-          </p:spPr>
-          <p:style>
-            <a:lnRef idx="1">
-              <a:schemeClr val="accent1"/>
-            </a:lnRef>
-            <a:fillRef idx="0">
-              <a:schemeClr val="accent1"/>
-            </a:fillRef>
-            <a:effectRef idx="0">
-              <a:schemeClr val="accent1"/>
-            </a:effectRef>
-            <a:fontRef idx="minor">
-              <a:schemeClr val="tx1"/>
-            </a:fontRef>
-          </p:style>
-        </p:cxnSp>
-        <p:cxnSp>
-          <p:nvCxnSpPr>
-            <p:cNvPr id="78" name="Straight Arrow Connector 77"/>
-            <p:cNvCxnSpPr>
-              <a:stCxn id="73" idx="4"/>
-              <a:endCxn id="74" idx="0"/>
-            </p:cNvCxnSpPr>
-            <p:nvPr/>
-          </p:nvCxnSpPr>
-          <p:spPr>
-            <a:xfrm flipH="1">
-              <a:off x="8111991" y="2701637"/>
-              <a:ext cx="1338331" cy="881066"/>
-            </a:xfrm>
-            <a:prstGeom prst="straightConnector1">
-              <a:avLst/>
-            </a:prstGeom>
-            <a:ln w="34925">
-              <a:tailEnd type="triangle"/>
-            </a:ln>
-          </p:spPr>
-          <p:style>
-            <a:lnRef idx="1">
-              <a:schemeClr val="accent1"/>
-            </a:lnRef>
-            <a:fillRef idx="0">
-              <a:schemeClr val="accent1"/>
-            </a:fillRef>
-            <a:effectRef idx="0">
-              <a:schemeClr val="accent1"/>
-            </a:effectRef>
-            <a:fontRef idx="minor">
-              <a:schemeClr val="tx1"/>
-            </a:fontRef>
-          </p:style>
-        </p:cxnSp>
-        <p:cxnSp>
-          <p:nvCxnSpPr>
-            <p:cNvPr id="79" name="Straight Arrow Connector 78"/>
-            <p:cNvCxnSpPr>
-              <a:stCxn id="73" idx="4"/>
-              <a:endCxn id="81" idx="0"/>
-            </p:cNvCxnSpPr>
-            <p:nvPr/>
-          </p:nvCxnSpPr>
-          <p:spPr>
-            <a:xfrm>
-              <a:off x="9450322" y="2701637"/>
-              <a:ext cx="266161" cy="816671"/>
-            </a:xfrm>
-            <a:prstGeom prst="straightConnector1">
-              <a:avLst/>
-            </a:prstGeom>
-            <a:ln w="34925">
-              <a:tailEnd type="triangle"/>
-            </a:ln>
-          </p:spPr>
-          <p:style>
-            <a:lnRef idx="1">
-              <a:schemeClr val="accent1"/>
-            </a:lnRef>
-            <a:fillRef idx="0">
-              <a:schemeClr val="accent1"/>
-            </a:fillRef>
-            <a:effectRef idx="0">
-              <a:schemeClr val="accent1"/>
-            </a:effectRef>
-            <a:fontRef idx="minor">
-              <a:schemeClr val="tx1"/>
-            </a:fontRef>
-          </p:style>
-        </p:cxnSp>
-        <p:cxnSp>
-          <p:nvCxnSpPr>
-            <p:cNvPr id="80" name="Elbow Connector 79"/>
-            <p:cNvCxnSpPr>
-              <a:stCxn id="81" idx="6"/>
-              <a:endCxn id="73" idx="6"/>
-            </p:cNvCxnSpPr>
-            <p:nvPr/>
-          </p:nvCxnSpPr>
-          <p:spPr>
-            <a:xfrm flipH="1" flipV="1">
-              <a:off x="9772294" y="2379665"/>
-              <a:ext cx="266161" cy="1460615"/>
-            </a:xfrm>
-            <a:prstGeom prst="bentConnector3">
-              <a:avLst>
-                <a:gd name="adj1" fmla="val -85888"/>
-              </a:avLst>
-            </a:prstGeom>
-            <a:ln w="25400">
-              <a:solidFill>
-                <a:srgbClr val="FF0000"/>
-              </a:solidFill>
-              <a:tailEnd type="triangle"/>
-            </a:ln>
-          </p:spPr>
-          <p:style>
-            <a:lnRef idx="1">
-              <a:schemeClr val="accent1"/>
-            </a:lnRef>
-            <a:fillRef idx="0">
-              <a:schemeClr val="accent1"/>
-            </a:fillRef>
-            <a:effectRef idx="0">
-              <a:schemeClr val="accent1"/>
-            </a:effectRef>
-            <a:fontRef idx="minor">
-              <a:schemeClr val="tx1"/>
-            </a:fontRef>
-          </p:style>
-        </p:cxnSp>
-        <p:sp>
-          <p:nvSpPr>
-            <p:cNvPr id="81" name="Oval 80"/>
-            <p:cNvSpPr/>
-            <p:nvPr/>
-          </p:nvSpPr>
-          <p:spPr>
-            <a:xfrm>
-              <a:off x="9394511" y="3518308"/>
-              <a:ext cx="643944" cy="643944"/>
-            </a:xfrm>
-            <a:prstGeom prst="ellipse">
-              <a:avLst/>
-            </a:prstGeom>
-          </p:spPr>
-          <p:style>
-            <a:lnRef idx="2">
-              <a:schemeClr val="accent1">
-                <a:shade val="50000"/>
-              </a:schemeClr>
-            </a:lnRef>
-            <a:fillRef idx="1">
-              <a:schemeClr val="accent1"/>
-            </a:fillRef>
-            <a:effectRef idx="0">
-              <a:schemeClr val="accent1"/>
-            </a:effectRef>
-            <a:fontRef idx="minor">
-              <a:schemeClr val="lt1"/>
-            </a:fontRef>
-          </p:style>
-          <p:txBody>
-            <a:bodyPr rtlCol="0" anchor="ctr"/>
-            <a:lstStyle/>
-            <a:p>
-              <a:pPr algn="ctr"/>
-              <a:endParaRPr lang="en-CA"/>
-            </a:p>
-          </p:txBody>
-        </p:sp>
-        <p:sp>
-          <p:nvSpPr>
-            <p:cNvPr id="83" name="Rectangle 82"/>
-            <p:cNvSpPr/>
-            <p:nvPr/>
-          </p:nvSpPr>
-          <p:spPr>
-            <a:xfrm>
-              <a:off x="7621523" y="2122088"/>
-              <a:ext cx="515155" cy="515155"/>
-            </a:xfrm>
-            <a:prstGeom prst="rect">
-              <a:avLst/>
-            </a:prstGeom>
-          </p:spPr>
-          <p:style>
-            <a:lnRef idx="2">
-              <a:schemeClr val="accent1">
-                <a:shade val="50000"/>
-              </a:schemeClr>
-            </a:lnRef>
-            <a:fillRef idx="1">
-              <a:schemeClr val="accent1"/>
-            </a:fillRef>
-            <a:effectRef idx="0">
-              <a:schemeClr val="accent1"/>
-            </a:effectRef>
-            <a:fontRef idx="minor">
-              <a:schemeClr val="lt1"/>
-            </a:fontRef>
-          </p:style>
-          <p:txBody>
-            <a:bodyPr rtlCol="0" anchor="ctr"/>
-            <a:lstStyle/>
-            <a:p>
-              <a:pPr algn="ctr"/>
-              <a:endParaRPr lang="en-CA"/>
-            </a:p>
-          </p:txBody>
-        </p:sp>
-        <p:cxnSp>
-          <p:nvCxnSpPr>
-            <p:cNvPr id="84" name="Elbow Connector 83"/>
-            <p:cNvCxnSpPr>
-              <a:stCxn id="74" idx="1"/>
-              <a:endCxn id="83" idx="1"/>
-            </p:cNvCxnSpPr>
-            <p:nvPr/>
-          </p:nvCxnSpPr>
-          <p:spPr>
-            <a:xfrm rot="10800000">
-              <a:off x="7621523" y="2379667"/>
-              <a:ext cx="232890" cy="1460615"/>
-            </a:xfrm>
-            <a:prstGeom prst="bentConnector3">
-              <a:avLst>
-                <a:gd name="adj1" fmla="val 198158"/>
-              </a:avLst>
-            </a:prstGeom>
-            <a:ln w="31750">
-              <a:solidFill>
-                <a:srgbClr val="FF0000"/>
-              </a:solidFill>
-              <a:tailEnd type="triangle"/>
-            </a:ln>
-          </p:spPr>
-          <p:style>
-            <a:lnRef idx="1">
-              <a:schemeClr val="accent1"/>
-            </a:lnRef>
-            <a:fillRef idx="0">
-              <a:schemeClr val="accent1"/>
-            </a:fillRef>
-            <a:effectRef idx="0">
-              <a:schemeClr val="accent1"/>
-            </a:effectRef>
-            <a:fontRef idx="minor">
-              <a:schemeClr val="tx1"/>
-            </a:fontRef>
-          </p:style>
-        </p:cxnSp>
-        <p:sp>
-          <p:nvSpPr>
-            <p:cNvPr id="85" name="Rectangle 84"/>
-            <p:cNvSpPr/>
-            <p:nvPr/>
-          </p:nvSpPr>
-          <p:spPr>
-            <a:xfrm>
-              <a:off x="8624462" y="3582703"/>
-              <a:ext cx="515155" cy="515155"/>
-            </a:xfrm>
-            <a:prstGeom prst="rect">
-              <a:avLst/>
-            </a:prstGeom>
-          </p:spPr>
-          <p:style>
-            <a:lnRef idx="2">
-              <a:schemeClr val="accent1">
-                <a:shade val="50000"/>
-              </a:schemeClr>
-            </a:lnRef>
-            <a:fillRef idx="1">
-              <a:schemeClr val="accent1"/>
-            </a:fillRef>
-            <a:effectRef idx="0">
-              <a:schemeClr val="accent1"/>
-            </a:effectRef>
-            <a:fontRef idx="minor">
-              <a:schemeClr val="lt1"/>
-            </a:fontRef>
-          </p:style>
-          <p:txBody>
-            <a:bodyPr rtlCol="0" anchor="ctr"/>
-            <a:lstStyle/>
-            <a:p>
-              <a:pPr algn="ctr"/>
-              <a:endParaRPr lang="en-CA"/>
-            </a:p>
-          </p:txBody>
-        </p:sp>
-        <p:cxnSp>
-          <p:nvCxnSpPr>
-            <p:cNvPr id="89" name="Straight Arrow Connector 88"/>
-            <p:cNvCxnSpPr/>
-            <p:nvPr/>
-          </p:nvCxnSpPr>
-          <p:spPr>
-            <a:xfrm flipH="1" flipV="1">
-              <a:off x="8781156" y="2723039"/>
-              <a:ext cx="229141" cy="795269"/>
-            </a:xfrm>
-            <a:prstGeom prst="straightConnector1">
-              <a:avLst/>
-            </a:prstGeom>
-            <a:ln w="31750">
-              <a:solidFill>
-                <a:srgbClr val="FF0000"/>
-              </a:solidFill>
-              <a:tailEnd type="triangle"/>
-            </a:ln>
-          </p:spPr>
-          <p:style>
-            <a:lnRef idx="1">
-              <a:schemeClr val="accent1"/>
-            </a:lnRef>
-            <a:fillRef idx="0">
-              <a:schemeClr val="accent1"/>
-            </a:fillRef>
-            <a:effectRef idx="0">
-              <a:schemeClr val="accent1"/>
-            </a:effectRef>
-            <a:fontRef idx="minor">
-              <a:schemeClr val="tx1"/>
-            </a:fontRef>
-          </p:style>
-        </p:cxnSp>
-      </p:grpSp>
-      <p:grpSp>
-        <p:nvGrpSpPr>
-          <p:cNvPr id="116" name="Group 115"/>
-          <p:cNvGrpSpPr/>
-          <p:nvPr/>
-        </p:nvGrpSpPr>
-        <p:grpSpPr>
+            <a:off x="7879101" y="2637243"/>
+            <a:ext cx="52334" cy="901682"/>
+          </a:xfrm>
+          <a:prstGeom prst="straightConnector1">
+            <a:avLst/>
+          </a:prstGeom>
+          <a:ln w="38100">
+            <a:prstDash val="sysDash"/>
+            <a:tailEnd type="triangle"/>
+          </a:ln>
+        </p:spPr>
+        <p:style>
+          <a:lnRef idx="1">
+            <a:schemeClr val="accent1"/>
+          </a:lnRef>
+          <a:fillRef idx="0">
+            <a:schemeClr val="accent1"/>
+          </a:fillRef>
+          <a:effectRef idx="0">
+            <a:schemeClr val="accent1"/>
+          </a:effectRef>
+          <a:fontRef idx="minor">
+            <a:schemeClr val="tx1"/>
+          </a:fontRef>
+        </p:style>
+      </p:cxnSp>
+      <p:cxnSp>
+        <p:nvCxnSpPr>
+          <p:cNvPr id="76" name="Straight Arrow Connector 75"/>
+          <p:cNvCxnSpPr/>
+          <p:nvPr/>
+        </p:nvCxnSpPr>
+        <p:spPr>
           <a:xfrm>
-            <a:off x="4099981" y="2057693"/>
-            <a:ext cx="2501340" cy="2104559"/>
-            <a:chOff x="4084882" y="2057693"/>
-            <a:chExt cx="2501340" cy="2104559"/>
-          </a:xfrm>
-        </p:grpSpPr>
-        <p:sp>
-          <p:nvSpPr>
-            <p:cNvPr id="34" name="Oval 33"/>
-            <p:cNvSpPr/>
-            <p:nvPr/>
-          </p:nvSpPr>
-          <p:spPr>
-            <a:xfrm>
-              <a:off x="4871812" y="2057693"/>
-              <a:ext cx="643944" cy="643944"/>
-            </a:xfrm>
-            <a:prstGeom prst="ellipse">
-              <a:avLst/>
-            </a:prstGeom>
-          </p:spPr>
-          <p:style>
-            <a:lnRef idx="2">
-              <a:schemeClr val="accent1">
-                <a:shade val="50000"/>
-              </a:schemeClr>
-            </a:lnRef>
-            <a:fillRef idx="1">
-              <a:schemeClr val="accent1"/>
-            </a:fillRef>
-            <a:effectRef idx="0">
-              <a:schemeClr val="accent1"/>
-            </a:effectRef>
-            <a:fontRef idx="minor">
-              <a:schemeClr val="lt1"/>
-            </a:fontRef>
-          </p:style>
-          <p:txBody>
-            <a:bodyPr rtlCol="0" anchor="ctr"/>
-            <a:lstStyle/>
-            <a:p>
-              <a:pPr algn="ctr"/>
-              <a:endParaRPr lang="en-CA"/>
-            </a:p>
-          </p:txBody>
-        </p:sp>
-        <p:sp>
-          <p:nvSpPr>
-            <p:cNvPr id="36" name="Oval 35"/>
-            <p:cNvSpPr/>
-            <p:nvPr/>
-          </p:nvSpPr>
-          <p:spPr>
-            <a:xfrm>
-              <a:off x="5787530" y="2057693"/>
-              <a:ext cx="643944" cy="643944"/>
-            </a:xfrm>
-            <a:prstGeom prst="ellipse">
-              <a:avLst/>
-            </a:prstGeom>
-          </p:spPr>
-          <p:style>
-            <a:lnRef idx="2">
-              <a:schemeClr val="accent1">
-                <a:shade val="50000"/>
-              </a:schemeClr>
-            </a:lnRef>
-            <a:fillRef idx="1">
-              <a:schemeClr val="accent1"/>
-            </a:fillRef>
-            <a:effectRef idx="0">
-              <a:schemeClr val="accent1"/>
-            </a:effectRef>
-            <a:fontRef idx="minor">
-              <a:schemeClr val="lt1"/>
-            </a:fontRef>
-          </p:style>
-          <p:txBody>
-            <a:bodyPr rtlCol="0" anchor="ctr"/>
-            <a:lstStyle/>
-            <a:p>
-              <a:pPr algn="ctr"/>
-              <a:endParaRPr lang="en-CA"/>
-            </a:p>
-          </p:txBody>
-        </p:sp>
-        <p:sp>
-          <p:nvSpPr>
-            <p:cNvPr id="37" name="Rectangle 36"/>
-            <p:cNvSpPr/>
-            <p:nvPr/>
-          </p:nvSpPr>
-          <p:spPr>
-            <a:xfrm>
-              <a:off x="4233930" y="3582703"/>
-              <a:ext cx="515155" cy="515155"/>
-            </a:xfrm>
-            <a:prstGeom prst="rect">
-              <a:avLst/>
-            </a:prstGeom>
-          </p:spPr>
-          <p:style>
-            <a:lnRef idx="2">
-              <a:schemeClr val="accent1">
-                <a:shade val="50000"/>
-              </a:schemeClr>
-            </a:lnRef>
-            <a:fillRef idx="1">
-              <a:schemeClr val="accent1"/>
-            </a:fillRef>
-            <a:effectRef idx="0">
-              <a:schemeClr val="accent1"/>
-            </a:effectRef>
-            <a:fontRef idx="minor">
-              <a:schemeClr val="lt1"/>
-            </a:fontRef>
-          </p:style>
-          <p:txBody>
-            <a:bodyPr rtlCol="0" anchor="ctr"/>
-            <a:lstStyle/>
-            <a:p>
-              <a:pPr algn="ctr"/>
-              <a:endParaRPr lang="en-CA"/>
-            </a:p>
-          </p:txBody>
-        </p:sp>
-        <p:cxnSp>
-          <p:nvCxnSpPr>
-            <p:cNvPr id="38" name="Straight Arrow Connector 37"/>
-            <p:cNvCxnSpPr>
-              <a:stCxn id="57" idx="2"/>
-              <a:endCxn id="37" idx="0"/>
-            </p:cNvCxnSpPr>
-            <p:nvPr/>
-          </p:nvCxnSpPr>
-          <p:spPr>
-            <a:xfrm>
-              <a:off x="4342460" y="2637243"/>
-              <a:ext cx="149048" cy="945460"/>
-            </a:xfrm>
-            <a:prstGeom prst="straightConnector1">
-              <a:avLst/>
-            </a:prstGeom>
-            <a:ln w="34925">
-              <a:tailEnd type="triangle"/>
-            </a:ln>
-          </p:spPr>
-          <p:style>
-            <a:lnRef idx="1">
-              <a:schemeClr val="accent1"/>
-            </a:lnRef>
-            <a:fillRef idx="0">
-              <a:schemeClr val="accent1"/>
-            </a:fillRef>
-            <a:effectRef idx="0">
-              <a:schemeClr val="accent1"/>
-            </a:effectRef>
-            <a:fontRef idx="minor">
-              <a:schemeClr val="tx1"/>
-            </a:fontRef>
-          </p:style>
-        </p:cxnSp>
-        <p:cxnSp>
-          <p:nvCxnSpPr>
-            <p:cNvPr id="39" name="Straight Arrow Connector 38"/>
-            <p:cNvCxnSpPr>
-              <a:stCxn id="34" idx="4"/>
-              <a:endCxn id="45" idx="0"/>
-            </p:cNvCxnSpPr>
-            <p:nvPr/>
-          </p:nvCxnSpPr>
-          <p:spPr>
-            <a:xfrm>
-              <a:off x="5193784" y="2701637"/>
-              <a:ext cx="151897" cy="816671"/>
-            </a:xfrm>
-            <a:prstGeom prst="straightConnector1">
-              <a:avLst/>
-            </a:prstGeom>
-            <a:ln w="34925">
-              <a:tailEnd type="triangle"/>
-            </a:ln>
-          </p:spPr>
-          <p:style>
-            <a:lnRef idx="1">
-              <a:schemeClr val="accent1"/>
-            </a:lnRef>
-            <a:fillRef idx="0">
-              <a:schemeClr val="accent1"/>
-            </a:fillRef>
-            <a:effectRef idx="0">
-              <a:schemeClr val="accent1"/>
-            </a:effectRef>
-            <a:fontRef idx="minor">
-              <a:schemeClr val="tx1"/>
-            </a:fontRef>
-          </p:style>
-        </p:cxnSp>
-        <p:cxnSp>
-          <p:nvCxnSpPr>
-            <p:cNvPr id="40" name="Straight Arrow Connector 39"/>
-            <p:cNvCxnSpPr>
-              <a:stCxn id="34" idx="4"/>
-              <a:endCxn id="37" idx="0"/>
-            </p:cNvCxnSpPr>
-            <p:nvPr/>
-          </p:nvCxnSpPr>
-          <p:spPr>
-            <a:xfrm flipH="1">
-              <a:off x="4491508" y="2701637"/>
-              <a:ext cx="702276" cy="881066"/>
-            </a:xfrm>
-            <a:prstGeom prst="straightConnector1">
-              <a:avLst/>
-            </a:prstGeom>
-            <a:ln w="34925">
-              <a:tailEnd type="triangle"/>
-            </a:ln>
-          </p:spPr>
-          <p:style>
-            <a:lnRef idx="1">
-              <a:schemeClr val="accent1"/>
-            </a:lnRef>
-            <a:fillRef idx="0">
-              <a:schemeClr val="accent1"/>
-            </a:fillRef>
-            <a:effectRef idx="0">
-              <a:schemeClr val="accent1"/>
-            </a:effectRef>
-            <a:fontRef idx="minor">
-              <a:schemeClr val="tx1"/>
-            </a:fontRef>
-          </p:style>
-        </p:cxnSp>
-        <p:cxnSp>
-          <p:nvCxnSpPr>
-            <p:cNvPr id="41" name="Straight Arrow Connector 40"/>
-            <p:cNvCxnSpPr>
-              <a:stCxn id="36" idx="4"/>
-              <a:endCxn id="37" idx="0"/>
-            </p:cNvCxnSpPr>
-            <p:nvPr/>
-          </p:nvCxnSpPr>
-          <p:spPr>
-            <a:xfrm flipH="1">
-              <a:off x="4491508" y="2701637"/>
-              <a:ext cx="1617994" cy="881066"/>
-            </a:xfrm>
-            <a:prstGeom prst="straightConnector1">
-              <a:avLst/>
-            </a:prstGeom>
-            <a:ln w="34925">
-              <a:tailEnd type="triangle"/>
-            </a:ln>
-          </p:spPr>
-          <p:style>
-            <a:lnRef idx="1">
-              <a:schemeClr val="accent1"/>
-            </a:lnRef>
-            <a:fillRef idx="0">
-              <a:schemeClr val="accent1"/>
-            </a:fillRef>
-            <a:effectRef idx="0">
-              <a:schemeClr val="accent1"/>
-            </a:effectRef>
-            <a:fontRef idx="minor">
-              <a:schemeClr val="tx1"/>
-            </a:fontRef>
-          </p:style>
-        </p:cxnSp>
-        <p:cxnSp>
-          <p:nvCxnSpPr>
-            <p:cNvPr id="42" name="Straight Arrow Connector 41"/>
-            <p:cNvCxnSpPr>
-              <a:stCxn id="36" idx="4"/>
-              <a:endCxn id="44" idx="0"/>
-            </p:cNvCxnSpPr>
-            <p:nvPr/>
-          </p:nvCxnSpPr>
-          <p:spPr>
-            <a:xfrm>
-              <a:off x="6109502" y="2701637"/>
-              <a:ext cx="154748" cy="816671"/>
-            </a:xfrm>
-            <a:prstGeom prst="straightConnector1">
-              <a:avLst/>
-            </a:prstGeom>
-            <a:ln w="34925">
-              <a:tailEnd type="triangle"/>
-            </a:ln>
-          </p:spPr>
-          <p:style>
-            <a:lnRef idx="1">
-              <a:schemeClr val="accent1"/>
-            </a:lnRef>
-            <a:fillRef idx="0">
-              <a:schemeClr val="accent1"/>
-            </a:fillRef>
-            <a:effectRef idx="0">
-              <a:schemeClr val="accent1"/>
-            </a:effectRef>
-            <a:fontRef idx="minor">
-              <a:schemeClr val="tx1"/>
-            </a:fontRef>
-          </p:style>
-        </p:cxnSp>
-        <p:cxnSp>
-          <p:nvCxnSpPr>
-            <p:cNvPr id="43" name="Elbow Connector 42"/>
-            <p:cNvCxnSpPr>
-              <a:stCxn id="44" idx="6"/>
-              <a:endCxn id="36" idx="6"/>
-            </p:cNvCxnSpPr>
-            <p:nvPr/>
-          </p:nvCxnSpPr>
-          <p:spPr>
-            <a:xfrm flipH="1" flipV="1">
-              <a:off x="6431474" y="2379665"/>
-              <a:ext cx="154748" cy="1460615"/>
-            </a:xfrm>
-            <a:prstGeom prst="bentConnector3">
-              <a:avLst>
-                <a:gd name="adj1" fmla="val -147724"/>
-              </a:avLst>
-            </a:prstGeom>
-            <a:ln w="31750">
-              <a:solidFill>
-                <a:srgbClr val="FF0000"/>
-              </a:solidFill>
-              <a:tailEnd type="triangle"/>
-            </a:ln>
-          </p:spPr>
-          <p:style>
-            <a:lnRef idx="1">
-              <a:schemeClr val="accent1"/>
-            </a:lnRef>
-            <a:fillRef idx="0">
-              <a:schemeClr val="accent1"/>
-            </a:fillRef>
-            <a:effectRef idx="0">
-              <a:schemeClr val="accent1"/>
-            </a:effectRef>
-            <a:fontRef idx="minor">
-              <a:schemeClr val="tx1"/>
-            </a:fontRef>
-          </p:style>
-        </p:cxnSp>
-        <p:sp>
-          <p:nvSpPr>
-            <p:cNvPr id="44" name="Oval 43"/>
-            <p:cNvSpPr/>
-            <p:nvPr/>
-          </p:nvSpPr>
-          <p:spPr>
-            <a:xfrm>
-              <a:off x="5942278" y="3518308"/>
-              <a:ext cx="643944" cy="643944"/>
-            </a:xfrm>
-            <a:prstGeom prst="ellipse">
-              <a:avLst/>
-            </a:prstGeom>
-          </p:spPr>
-          <p:style>
-            <a:lnRef idx="2">
-              <a:schemeClr val="accent1">
-                <a:shade val="50000"/>
-              </a:schemeClr>
-            </a:lnRef>
-            <a:fillRef idx="1">
-              <a:schemeClr val="accent1"/>
-            </a:fillRef>
-            <a:effectRef idx="0">
-              <a:schemeClr val="accent1"/>
-            </a:effectRef>
-            <a:fontRef idx="minor">
-              <a:schemeClr val="lt1"/>
-            </a:fontRef>
-          </p:style>
-          <p:txBody>
-            <a:bodyPr rtlCol="0" anchor="ctr"/>
-            <a:lstStyle/>
-            <a:p>
-              <a:pPr algn="ctr"/>
-              <a:endParaRPr lang="en-CA"/>
-            </a:p>
-          </p:txBody>
-        </p:sp>
-        <p:sp>
-          <p:nvSpPr>
-            <p:cNvPr id="45" name="Oval 44"/>
-            <p:cNvSpPr/>
-            <p:nvPr/>
-          </p:nvSpPr>
-          <p:spPr>
-            <a:xfrm>
-              <a:off x="5023709" y="3518308"/>
-              <a:ext cx="643944" cy="643944"/>
-            </a:xfrm>
-            <a:prstGeom prst="ellipse">
-              <a:avLst/>
-            </a:prstGeom>
-          </p:spPr>
-          <p:style>
-            <a:lnRef idx="2">
-              <a:schemeClr val="accent1">
-                <a:shade val="50000"/>
-              </a:schemeClr>
-            </a:lnRef>
-            <a:fillRef idx="1">
-              <a:schemeClr val="accent1"/>
-            </a:fillRef>
-            <a:effectRef idx="0">
-              <a:schemeClr val="accent1"/>
-            </a:effectRef>
-            <a:fontRef idx="minor">
-              <a:schemeClr val="lt1"/>
-            </a:fontRef>
-          </p:style>
-          <p:txBody>
-            <a:bodyPr rtlCol="0" anchor="ctr"/>
-            <a:lstStyle/>
-            <a:p>
-              <a:pPr algn="ctr"/>
-              <a:endParaRPr lang="en-CA"/>
-            </a:p>
-          </p:txBody>
-        </p:sp>
-        <p:sp>
-          <p:nvSpPr>
-            <p:cNvPr id="57" name="Rectangle 56"/>
-            <p:cNvSpPr/>
-            <p:nvPr/>
-          </p:nvSpPr>
-          <p:spPr>
-            <a:xfrm>
-              <a:off x="4084882" y="2122088"/>
-              <a:ext cx="515155" cy="515155"/>
-            </a:xfrm>
-            <a:prstGeom prst="rect">
-              <a:avLst/>
-            </a:prstGeom>
-          </p:spPr>
-          <p:style>
-            <a:lnRef idx="2">
-              <a:schemeClr val="accent1">
-                <a:shade val="50000"/>
-              </a:schemeClr>
-            </a:lnRef>
-            <a:fillRef idx="1">
-              <a:schemeClr val="accent1"/>
-            </a:fillRef>
-            <a:effectRef idx="0">
-              <a:schemeClr val="accent1"/>
-            </a:effectRef>
-            <a:fontRef idx="minor">
-              <a:schemeClr val="lt1"/>
-            </a:fontRef>
-          </p:style>
-          <p:txBody>
-            <a:bodyPr rtlCol="0" anchor="ctr"/>
-            <a:lstStyle/>
-            <a:p>
-              <a:pPr algn="ctr"/>
-              <a:endParaRPr lang="en-CA"/>
-            </a:p>
-          </p:txBody>
-        </p:sp>
-        <p:cxnSp>
-          <p:nvCxnSpPr>
-            <p:cNvPr id="69" name="Elbow Connector 68"/>
-            <p:cNvCxnSpPr>
-              <a:stCxn id="37" idx="1"/>
-              <a:endCxn id="57" idx="1"/>
-            </p:cNvCxnSpPr>
-            <p:nvPr/>
-          </p:nvCxnSpPr>
-          <p:spPr>
-            <a:xfrm rot="10800000">
-              <a:off x="4084882" y="2379667"/>
-              <a:ext cx="149048" cy="1460615"/>
-            </a:xfrm>
-            <a:prstGeom prst="bentConnector3">
-              <a:avLst>
-                <a:gd name="adj1" fmla="val 253373"/>
-              </a:avLst>
-            </a:prstGeom>
-            <a:ln w="31750">
-              <a:solidFill>
-                <a:srgbClr val="FF0000"/>
-              </a:solidFill>
-              <a:tailEnd type="triangle"/>
-            </a:ln>
-          </p:spPr>
-          <p:style>
-            <a:lnRef idx="1">
-              <a:schemeClr val="accent1"/>
-            </a:lnRef>
-            <a:fillRef idx="0">
-              <a:schemeClr val="accent1"/>
-            </a:fillRef>
-            <a:effectRef idx="0">
-              <a:schemeClr val="accent1"/>
-            </a:effectRef>
-            <a:fontRef idx="minor">
-              <a:schemeClr val="tx1"/>
-            </a:fontRef>
-          </p:style>
-        </p:cxnSp>
-        <p:cxnSp>
-          <p:nvCxnSpPr>
-            <p:cNvPr id="113" name="Straight Arrow Connector 112"/>
-            <p:cNvCxnSpPr/>
-            <p:nvPr/>
-          </p:nvCxnSpPr>
-          <p:spPr>
-            <a:xfrm flipH="1" flipV="1">
-              <a:off x="5361008" y="2667781"/>
-              <a:ext cx="100884" cy="859664"/>
-            </a:xfrm>
-            <a:prstGeom prst="straightConnector1">
-              <a:avLst/>
-            </a:prstGeom>
-            <a:ln w="31750">
-              <a:solidFill>
-                <a:srgbClr val="FF0000"/>
-              </a:solidFill>
-              <a:tailEnd type="triangle"/>
-            </a:ln>
-          </p:spPr>
-          <p:style>
-            <a:lnRef idx="1">
-              <a:schemeClr val="accent1"/>
-            </a:lnRef>
-            <a:fillRef idx="0">
-              <a:schemeClr val="accent1"/>
-            </a:fillRef>
-            <a:effectRef idx="0">
-              <a:schemeClr val="accent1"/>
-            </a:effectRef>
-            <a:fontRef idx="minor">
-              <a:schemeClr val="tx1"/>
-            </a:fontRef>
-          </p:style>
-        </p:cxnSp>
-      </p:grpSp>
+            <a:off x="8632514" y="2701637"/>
+            <a:ext cx="203344" cy="773201"/>
+          </a:xfrm>
+          <a:prstGeom prst="straightConnector1">
+            <a:avLst/>
+          </a:prstGeom>
+          <a:ln w="38100">
+            <a:prstDash val="sysDash"/>
+            <a:tailEnd type="triangle"/>
+          </a:ln>
+        </p:spPr>
+        <p:style>
+          <a:lnRef idx="1">
+            <a:schemeClr val="accent1"/>
+          </a:lnRef>
+          <a:fillRef idx="0">
+            <a:schemeClr val="accent1"/>
+          </a:fillRef>
+          <a:effectRef idx="0">
+            <a:schemeClr val="accent1"/>
+          </a:effectRef>
+          <a:fontRef idx="minor">
+            <a:schemeClr val="tx1"/>
+          </a:fontRef>
+        </p:style>
+      </p:cxnSp>
+      <p:cxnSp>
+        <p:nvCxnSpPr>
+          <p:cNvPr id="77" name="Straight Arrow Connector 76"/>
+          <p:cNvCxnSpPr/>
+          <p:nvPr/>
+        </p:nvCxnSpPr>
+        <p:spPr>
+          <a:xfrm flipH="1">
+            <a:off x="8060881" y="2701637"/>
+            <a:ext cx="571634" cy="810825"/>
+          </a:xfrm>
+          <a:prstGeom prst="straightConnector1">
+            <a:avLst/>
+          </a:prstGeom>
+          <a:ln w="38100">
+            <a:prstDash val="sysDash"/>
+            <a:tailEnd type="triangle"/>
+          </a:ln>
+        </p:spPr>
+        <p:style>
+          <a:lnRef idx="1">
+            <a:schemeClr val="accent1"/>
+          </a:lnRef>
+          <a:fillRef idx="0">
+            <a:schemeClr val="accent1"/>
+          </a:fillRef>
+          <a:effectRef idx="0">
+            <a:schemeClr val="accent1"/>
+          </a:effectRef>
+          <a:fontRef idx="minor">
+            <a:schemeClr val="tx1"/>
+          </a:fontRef>
+        </p:style>
+      </p:cxnSp>
+      <p:cxnSp>
+        <p:nvCxnSpPr>
+          <p:cNvPr id="78" name="Straight Arrow Connector 77"/>
+          <p:cNvCxnSpPr/>
+          <p:nvPr/>
+        </p:nvCxnSpPr>
+        <p:spPr>
+          <a:xfrm flipH="1">
+            <a:off x="8246044" y="2701637"/>
+            <a:ext cx="1204279" cy="803352"/>
+          </a:xfrm>
+          <a:prstGeom prst="straightConnector1">
+            <a:avLst/>
+          </a:prstGeom>
+          <a:ln w="38100">
+            <a:prstDash val="sysDash"/>
+            <a:tailEnd type="triangle"/>
+          </a:ln>
+        </p:spPr>
+        <p:style>
+          <a:lnRef idx="1">
+            <a:schemeClr val="accent1"/>
+          </a:lnRef>
+          <a:fillRef idx="0">
+            <a:schemeClr val="accent1"/>
+          </a:fillRef>
+          <a:effectRef idx="0">
+            <a:schemeClr val="accent1"/>
+          </a:effectRef>
+          <a:fontRef idx="minor">
+            <a:schemeClr val="tx1"/>
+          </a:fontRef>
+        </p:style>
+      </p:cxnSp>
+      <p:cxnSp>
+        <p:nvCxnSpPr>
+          <p:cNvPr id="79" name="Straight Arrow Connector 78"/>
+          <p:cNvCxnSpPr>
+            <a:endCxn id="81" idx="0"/>
+          </p:cNvCxnSpPr>
+          <p:nvPr/>
+        </p:nvCxnSpPr>
+        <p:spPr>
+          <a:xfrm>
+            <a:off x="9450322" y="2701637"/>
+            <a:ext cx="266161" cy="803352"/>
+          </a:xfrm>
+          <a:prstGeom prst="straightConnector1">
+            <a:avLst/>
+          </a:prstGeom>
+          <a:ln w="38100">
+            <a:prstDash val="sysDash"/>
+            <a:tailEnd type="triangle"/>
+          </a:ln>
+        </p:spPr>
+        <p:style>
+          <a:lnRef idx="1">
+            <a:schemeClr val="accent1"/>
+          </a:lnRef>
+          <a:fillRef idx="0">
+            <a:schemeClr val="accent1"/>
+          </a:fillRef>
+          <a:effectRef idx="0">
+            <a:schemeClr val="accent1"/>
+          </a:effectRef>
+          <a:fontRef idx="minor">
+            <a:schemeClr val="tx1"/>
+          </a:fontRef>
+        </p:style>
+      </p:cxnSp>
+      <p:cxnSp>
+        <p:nvCxnSpPr>
+          <p:cNvPr id="80" name="Elbow Connector 79"/>
+          <p:cNvCxnSpPr>
+            <a:stCxn id="81" idx="6"/>
+            <a:endCxn id="88" idx="3"/>
+          </p:cNvCxnSpPr>
+          <p:nvPr/>
+        </p:nvCxnSpPr>
+        <p:spPr>
+          <a:xfrm flipH="1" flipV="1">
+            <a:off x="9919826" y="2353202"/>
+            <a:ext cx="118629" cy="1473759"/>
+          </a:xfrm>
+          <a:prstGeom prst="bentConnector3">
+            <a:avLst>
+              <a:gd name="adj1" fmla="val -192702"/>
+            </a:avLst>
+          </a:prstGeom>
+          <a:ln w="38100">
+            <a:solidFill>
+              <a:srgbClr val="FF0000"/>
+            </a:solidFill>
+            <a:tailEnd type="triangle"/>
+          </a:ln>
+        </p:spPr>
+        <p:style>
+          <a:lnRef idx="1">
+            <a:schemeClr val="accent1"/>
+          </a:lnRef>
+          <a:fillRef idx="0">
+            <a:schemeClr val="accent1"/>
+          </a:fillRef>
+          <a:effectRef idx="0">
+            <a:schemeClr val="accent1"/>
+          </a:effectRef>
+          <a:fontRef idx="minor">
+            <a:schemeClr val="tx1"/>
+          </a:fontRef>
+        </p:style>
+      </p:cxnSp>
+      <p:sp>
+        <p:nvSpPr>
+          <p:cNvPr id="81" name="Oval 80"/>
+          <p:cNvSpPr/>
+          <p:nvPr/>
+        </p:nvSpPr>
+        <p:spPr>
+          <a:xfrm>
+            <a:off x="9394511" y="3504989"/>
+            <a:ext cx="643944" cy="643944"/>
+          </a:xfrm>
+          <a:prstGeom prst="ellipse">
+            <a:avLst/>
+          </a:prstGeom>
+        </p:spPr>
+        <p:style>
+          <a:lnRef idx="2">
+            <a:schemeClr val="accent1">
+              <a:shade val="50000"/>
+            </a:schemeClr>
+          </a:lnRef>
+          <a:fillRef idx="1">
+            <a:schemeClr val="accent1"/>
+          </a:fillRef>
+          <a:effectRef idx="0">
+            <a:schemeClr val="accent1"/>
+          </a:effectRef>
+          <a:fontRef idx="minor">
+            <a:schemeClr val="lt1"/>
+          </a:fontRef>
+        </p:style>
+        <p:txBody>
+          <a:bodyPr rtlCol="0" anchor="ctr"/>
+          <a:lstStyle/>
+          <a:p>
+            <a:pPr algn="ctr"/>
+            <a:endParaRPr lang="en-CA"/>
+          </a:p>
+        </p:txBody>
+      </p:sp>
+      <p:cxnSp>
+        <p:nvCxnSpPr>
+          <p:cNvPr id="84" name="Elbow Connector 83"/>
+          <p:cNvCxnSpPr>
+            <a:stCxn id="94" idx="1"/>
+            <a:endCxn id="91" idx="2"/>
+          </p:cNvCxnSpPr>
+          <p:nvPr/>
+        </p:nvCxnSpPr>
+        <p:spPr>
+          <a:xfrm rot="10800000">
+            <a:off x="7626779" y="2353203"/>
+            <a:ext cx="16621" cy="1473759"/>
+          </a:xfrm>
+          <a:prstGeom prst="bentConnector3">
+            <a:avLst>
+              <a:gd name="adj1" fmla="val 1475369"/>
+            </a:avLst>
+          </a:prstGeom>
+          <a:ln w="38100">
+            <a:solidFill>
+              <a:srgbClr val="FF0000"/>
+            </a:solidFill>
+            <a:tailEnd type="triangle"/>
+          </a:ln>
+        </p:spPr>
+        <p:style>
+          <a:lnRef idx="1">
+            <a:schemeClr val="accent1"/>
+          </a:lnRef>
+          <a:fillRef idx="0">
+            <a:schemeClr val="accent1"/>
+          </a:fillRef>
+          <a:effectRef idx="0">
+            <a:schemeClr val="accent1"/>
+          </a:effectRef>
+          <a:fontRef idx="minor">
+            <a:schemeClr val="tx1"/>
+          </a:fontRef>
+        </p:style>
+      </p:cxnSp>
+      <p:cxnSp>
+        <p:nvCxnSpPr>
+          <p:cNvPr id="89" name="Straight Arrow Connector 88"/>
+          <p:cNvCxnSpPr>
+            <a:endCxn id="109" idx="2"/>
+          </p:cNvCxnSpPr>
+          <p:nvPr/>
+        </p:nvCxnSpPr>
+        <p:spPr>
+          <a:xfrm flipH="1" flipV="1">
+            <a:off x="8776908" y="2641238"/>
+            <a:ext cx="233390" cy="877071"/>
+          </a:xfrm>
+          <a:prstGeom prst="straightConnector1">
+            <a:avLst/>
+          </a:prstGeom>
+          <a:ln w="38100">
+            <a:solidFill>
+              <a:srgbClr val="FF0000"/>
+            </a:solidFill>
+            <a:tailEnd type="triangle"/>
+          </a:ln>
+        </p:spPr>
+        <p:style>
+          <a:lnRef idx="1">
+            <a:schemeClr val="accent1"/>
+          </a:lnRef>
+          <a:fillRef idx="0">
+            <a:schemeClr val="accent1"/>
+          </a:fillRef>
+          <a:effectRef idx="0">
+            <a:schemeClr val="accent1"/>
+          </a:effectRef>
+          <a:fontRef idx="minor">
+            <a:schemeClr val="tx1"/>
+          </a:fontRef>
+        </p:style>
+      </p:cxnSp>
+      <p:cxnSp>
+        <p:nvCxnSpPr>
+          <p:cNvPr id="38" name="Straight Arrow Connector 37"/>
+          <p:cNvCxnSpPr>
+            <a:stCxn id="87" idx="4"/>
+            <a:endCxn id="45" idx="0"/>
+          </p:cNvCxnSpPr>
+          <p:nvPr/>
+        </p:nvCxnSpPr>
+        <p:spPr>
+          <a:xfrm>
+            <a:off x="4459261" y="2675174"/>
+            <a:ext cx="0" cy="829815"/>
+          </a:xfrm>
+          <a:prstGeom prst="straightConnector1">
+            <a:avLst/>
+          </a:prstGeom>
+          <a:ln w="38100">
+            <a:prstDash val="sysDash"/>
+            <a:tailEnd type="triangle"/>
+          </a:ln>
+        </p:spPr>
+        <p:style>
+          <a:lnRef idx="1">
+            <a:schemeClr val="accent1"/>
+          </a:lnRef>
+          <a:fillRef idx="0">
+            <a:schemeClr val="accent1"/>
+          </a:fillRef>
+          <a:effectRef idx="0">
+            <a:schemeClr val="accent1"/>
+          </a:effectRef>
+          <a:fontRef idx="minor">
+            <a:schemeClr val="tx1"/>
+          </a:fontRef>
+        </p:style>
+      </p:cxnSp>
+      <p:cxnSp>
+        <p:nvCxnSpPr>
+          <p:cNvPr id="40" name="Straight Arrow Connector 39"/>
+          <p:cNvCxnSpPr>
+            <a:stCxn id="86" idx="2"/>
+          </p:cNvCxnSpPr>
+          <p:nvPr/>
+        </p:nvCxnSpPr>
+        <p:spPr>
+          <a:xfrm flipH="1">
+            <a:off x="4596038" y="2641238"/>
+            <a:ext cx="720273" cy="873293"/>
+          </a:xfrm>
+          <a:prstGeom prst="straightConnector1">
+            <a:avLst/>
+          </a:prstGeom>
+          <a:ln w="38100">
+            <a:prstDash val="sysDash"/>
+            <a:tailEnd type="triangle"/>
+          </a:ln>
+        </p:spPr>
+        <p:style>
+          <a:lnRef idx="1">
+            <a:schemeClr val="accent1"/>
+          </a:lnRef>
+          <a:fillRef idx="0">
+            <a:schemeClr val="accent1"/>
+          </a:fillRef>
+          <a:effectRef idx="0">
+            <a:schemeClr val="accent1"/>
+          </a:effectRef>
+          <a:fontRef idx="minor">
+            <a:schemeClr val="tx1"/>
+          </a:fontRef>
+        </p:style>
+      </p:cxnSp>
+      <p:cxnSp>
+        <p:nvCxnSpPr>
+          <p:cNvPr id="41" name="Straight Arrow Connector 40"/>
+          <p:cNvCxnSpPr>
+            <a:stCxn id="82" idx="2"/>
+            <a:endCxn id="45" idx="7"/>
+          </p:cNvCxnSpPr>
+          <p:nvPr/>
+        </p:nvCxnSpPr>
+        <p:spPr>
+          <a:xfrm flipH="1">
+            <a:off x="4686930" y="2641238"/>
+            <a:ext cx="1513480" cy="958054"/>
+          </a:xfrm>
+          <a:prstGeom prst="straightConnector1">
+            <a:avLst/>
+          </a:prstGeom>
+          <a:ln w="38100">
+            <a:prstDash val="sysDash"/>
+            <a:tailEnd type="triangle"/>
+          </a:ln>
+        </p:spPr>
+        <p:style>
+          <a:lnRef idx="1">
+            <a:schemeClr val="accent1"/>
+          </a:lnRef>
+          <a:fillRef idx="0">
+            <a:schemeClr val="accent1"/>
+          </a:fillRef>
+          <a:effectRef idx="0">
+            <a:schemeClr val="accent1"/>
+          </a:effectRef>
+          <a:fontRef idx="minor">
+            <a:schemeClr val="tx1"/>
+          </a:fontRef>
+        </p:style>
+      </p:cxnSp>
+      <p:cxnSp>
+        <p:nvCxnSpPr>
+          <p:cNvPr id="42" name="Straight Arrow Connector 41"/>
+          <p:cNvCxnSpPr>
+            <a:stCxn id="82" idx="2"/>
+          </p:cNvCxnSpPr>
+          <p:nvPr/>
+        </p:nvCxnSpPr>
+        <p:spPr>
+          <a:xfrm>
+            <a:off x="6200410" y="2641238"/>
+            <a:ext cx="78939" cy="877070"/>
+          </a:xfrm>
+          <a:prstGeom prst="straightConnector1">
+            <a:avLst/>
+          </a:prstGeom>
+          <a:ln w="38100">
+            <a:prstDash val="sysDash"/>
+            <a:tailEnd type="triangle"/>
+          </a:ln>
+        </p:spPr>
+        <p:style>
+          <a:lnRef idx="1">
+            <a:schemeClr val="accent1"/>
+          </a:lnRef>
+          <a:fillRef idx="0">
+            <a:schemeClr val="accent1"/>
+          </a:fillRef>
+          <a:effectRef idx="0">
+            <a:schemeClr val="accent1"/>
+          </a:effectRef>
+          <a:fontRef idx="minor">
+            <a:schemeClr val="tx1"/>
+          </a:fontRef>
+        </p:style>
+      </p:cxnSp>
+      <p:cxnSp>
+        <p:nvCxnSpPr>
+          <p:cNvPr id="43" name="Elbow Connector 42"/>
+          <p:cNvCxnSpPr>
+            <a:stCxn id="97" idx="3"/>
+            <a:endCxn id="82" idx="3"/>
+          </p:cNvCxnSpPr>
+          <p:nvPr/>
+        </p:nvCxnSpPr>
+        <p:spPr>
+          <a:xfrm flipV="1">
+            <a:off x="6488446" y="2353202"/>
+            <a:ext cx="12700" cy="1473759"/>
+          </a:xfrm>
+          <a:prstGeom prst="bentConnector3">
+            <a:avLst>
+              <a:gd name="adj1" fmla="val 1800000"/>
+            </a:avLst>
+          </a:prstGeom>
+          <a:ln w="38100">
+            <a:solidFill>
+              <a:srgbClr val="FF0000"/>
+            </a:solidFill>
+            <a:tailEnd type="triangle"/>
+          </a:ln>
+        </p:spPr>
+        <p:style>
+          <a:lnRef idx="1">
+            <a:schemeClr val="accent1"/>
+          </a:lnRef>
+          <a:fillRef idx="0">
+            <a:schemeClr val="accent1"/>
+          </a:fillRef>
+          <a:effectRef idx="0">
+            <a:schemeClr val="accent1"/>
+          </a:effectRef>
+          <a:fontRef idx="minor">
+            <a:schemeClr val="tx1"/>
+          </a:fontRef>
+        </p:style>
+      </p:cxnSp>
+      <p:sp>
+        <p:nvSpPr>
+          <p:cNvPr id="45" name="Oval 44"/>
+          <p:cNvSpPr/>
+          <p:nvPr/>
+        </p:nvSpPr>
+        <p:spPr>
+          <a:xfrm>
+            <a:off x="4137289" y="3504989"/>
+            <a:ext cx="643944" cy="643944"/>
+          </a:xfrm>
+          <a:prstGeom prst="ellipse">
+            <a:avLst/>
+          </a:prstGeom>
+        </p:spPr>
+        <p:style>
+          <a:lnRef idx="2">
+            <a:schemeClr val="accent1">
+              <a:shade val="50000"/>
+            </a:schemeClr>
+          </a:lnRef>
+          <a:fillRef idx="1">
+            <a:schemeClr val="accent1"/>
+          </a:fillRef>
+          <a:effectRef idx="0">
+            <a:schemeClr val="accent1"/>
+          </a:effectRef>
+          <a:fontRef idx="minor">
+            <a:schemeClr val="lt1"/>
+          </a:fontRef>
+        </p:style>
+        <p:txBody>
+          <a:bodyPr rtlCol="0" anchor="ctr"/>
+          <a:lstStyle/>
+          <a:p>
+            <a:pPr algn="ctr"/>
+            <a:endParaRPr lang="en-CA"/>
+          </a:p>
+        </p:txBody>
+      </p:sp>
+      <p:cxnSp>
+        <p:nvCxnSpPr>
+          <p:cNvPr id="69" name="Elbow Connector 68"/>
+          <p:cNvCxnSpPr>
+            <a:stCxn id="45" idx="2"/>
+            <a:endCxn id="87" idx="2"/>
+          </p:cNvCxnSpPr>
+          <p:nvPr/>
+        </p:nvCxnSpPr>
+        <p:spPr>
+          <a:xfrm rot="10800000">
+            <a:off x="4137289" y="2353203"/>
+            <a:ext cx="12700" cy="1473759"/>
+          </a:xfrm>
+          <a:prstGeom prst="bentConnector3">
+            <a:avLst>
+              <a:gd name="adj1" fmla="val 1800000"/>
+            </a:avLst>
+          </a:prstGeom>
+          <a:ln w="38100">
+            <a:solidFill>
+              <a:srgbClr val="FF0000"/>
+            </a:solidFill>
+            <a:tailEnd type="triangle"/>
+          </a:ln>
+        </p:spPr>
+        <p:style>
+          <a:lnRef idx="1">
+            <a:schemeClr val="accent1"/>
+          </a:lnRef>
+          <a:fillRef idx="0">
+            <a:schemeClr val="accent1"/>
+          </a:fillRef>
+          <a:effectRef idx="0">
+            <a:schemeClr val="accent1"/>
+          </a:effectRef>
+          <a:fontRef idx="minor">
+            <a:schemeClr val="tx1"/>
+          </a:fontRef>
+        </p:style>
+      </p:cxnSp>
+      <p:cxnSp>
+        <p:nvCxnSpPr>
+          <p:cNvPr id="113" name="Straight Arrow Connector 112"/>
+          <p:cNvCxnSpPr>
+            <a:endCxn id="86" idx="2"/>
+          </p:cNvCxnSpPr>
+          <p:nvPr/>
+        </p:nvCxnSpPr>
+        <p:spPr>
+          <a:xfrm flipH="1" flipV="1">
+            <a:off x="5316311" y="2641238"/>
+            <a:ext cx="160680" cy="886207"/>
+          </a:xfrm>
+          <a:prstGeom prst="straightConnector1">
+            <a:avLst/>
+          </a:prstGeom>
+          <a:ln w="38100">
+            <a:solidFill>
+              <a:srgbClr val="FF0000"/>
+            </a:solidFill>
+            <a:tailEnd type="triangle"/>
+          </a:ln>
+        </p:spPr>
+        <p:style>
+          <a:lnRef idx="1">
+            <a:schemeClr val="accent1"/>
+          </a:lnRef>
+          <a:fillRef idx="0">
+            <a:schemeClr val="accent1"/>
+          </a:fillRef>
+          <a:effectRef idx="0">
+            <a:schemeClr val="accent1"/>
+          </a:effectRef>
+          <a:fontRef idx="minor">
+            <a:schemeClr val="tx1"/>
+          </a:fontRef>
+        </p:style>
+      </p:cxnSp>
       <p:sp>
         <p:nvSpPr>
           <p:cNvPr id="118" name="TextBox 117"/>
@@ -4674,6 +3736,1435 @@
               <a:t>b.</a:t>
             </a:r>
             <a:endParaRPr lang="en-CA" b="1" dirty="0"/>
+          </a:p>
+        </p:txBody>
+      </p:sp>
+      <p:sp>
+        <p:nvSpPr>
+          <p:cNvPr id="2" name="TextBox 1"/>
+          <p:cNvSpPr txBox="1"/>
+          <p:nvPr/>
+        </p:nvSpPr>
+        <p:spPr>
+          <a:xfrm>
+            <a:off x="10416238" y="2176968"/>
+            <a:ext cx="1366784" cy="369332"/>
+          </a:xfrm>
+          <a:prstGeom prst="rect">
+            <a:avLst/>
+          </a:prstGeom>
+          <a:noFill/>
+        </p:spPr>
+        <p:txBody>
+          <a:bodyPr wrap="none" rtlCol="0">
+            <a:spAutoFit/>
+          </a:bodyPr>
+          <a:lstStyle/>
+          <a:p>
+            <a:r>
+              <a:rPr lang="en-CA" dirty="0" smtClean="0"/>
+              <a:t>Tenure Track</a:t>
+            </a:r>
+            <a:endParaRPr lang="en-CA" dirty="0"/>
+          </a:p>
+        </p:txBody>
+      </p:sp>
+      <p:sp>
+        <p:nvSpPr>
+          <p:cNvPr id="50" name="TextBox 49"/>
+          <p:cNvSpPr txBox="1"/>
+          <p:nvPr/>
+        </p:nvSpPr>
+        <p:spPr>
+          <a:xfrm>
+            <a:off x="10389454" y="3527445"/>
+            <a:ext cx="1058560" cy="646331"/>
+          </a:xfrm>
+          <a:prstGeom prst="rect">
+            <a:avLst/>
+          </a:prstGeom>
+          <a:noFill/>
+        </p:spPr>
+        <p:txBody>
+          <a:bodyPr wrap="none" rtlCol="0">
+            <a:spAutoFit/>
+          </a:bodyPr>
+          <a:lstStyle/>
+          <a:p>
+            <a:pPr algn="ctr"/>
+            <a:r>
+              <a:rPr lang="en-CA" dirty="0" smtClean="0"/>
+              <a:t>Graduate</a:t>
+            </a:r>
+          </a:p>
+          <a:p>
+            <a:pPr algn="ctr"/>
+            <a:r>
+              <a:rPr lang="en-CA" dirty="0" smtClean="0"/>
+              <a:t>Postdoc</a:t>
+            </a:r>
+            <a:endParaRPr lang="en-CA" dirty="0"/>
+          </a:p>
+        </p:txBody>
+      </p:sp>
+      <p:sp>
+        <p:nvSpPr>
+          <p:cNvPr id="51" name="Rectangle 50"/>
+          <p:cNvSpPr>
+            <a:spLocks noChangeAspect="1"/>
+          </p:cNvSpPr>
+          <p:nvPr/>
+        </p:nvSpPr>
+        <p:spPr>
+          <a:xfrm>
+            <a:off x="2519715" y="2065166"/>
+            <a:ext cx="576072" cy="576072"/>
+          </a:xfrm>
+          <a:prstGeom prst="rect">
+            <a:avLst/>
+          </a:prstGeom>
+          <a:solidFill>
+            <a:schemeClr val="accent1">
+              <a:lumMod val="50000"/>
+            </a:schemeClr>
+          </a:solidFill>
+        </p:spPr>
+        <p:style>
+          <a:lnRef idx="2">
+            <a:schemeClr val="accent1">
+              <a:shade val="50000"/>
+            </a:schemeClr>
+          </a:lnRef>
+          <a:fillRef idx="1">
+            <a:schemeClr val="accent1"/>
+          </a:fillRef>
+          <a:effectRef idx="0">
+            <a:schemeClr val="accent1"/>
+          </a:effectRef>
+          <a:fontRef idx="minor">
+            <a:schemeClr val="lt1"/>
+          </a:fontRef>
+        </p:style>
+        <p:txBody>
+          <a:bodyPr rtlCol="0" anchor="ctr"/>
+          <a:lstStyle/>
+          <a:p>
+            <a:pPr algn="ctr"/>
+            <a:endParaRPr lang="en-CA"/>
+          </a:p>
+        </p:txBody>
+      </p:sp>
+      <p:sp>
+        <p:nvSpPr>
+          <p:cNvPr id="52" name="Rectangle 51"/>
+          <p:cNvSpPr>
+            <a:spLocks noChangeAspect="1"/>
+          </p:cNvSpPr>
+          <p:nvPr/>
+        </p:nvSpPr>
+        <p:spPr>
+          <a:xfrm>
+            <a:off x="1698417" y="2065166"/>
+            <a:ext cx="576072" cy="576072"/>
+          </a:xfrm>
+          <a:prstGeom prst="rect">
+            <a:avLst/>
+          </a:prstGeom>
+          <a:solidFill>
+            <a:schemeClr val="accent1">
+              <a:lumMod val="50000"/>
+            </a:schemeClr>
+          </a:solidFill>
+        </p:spPr>
+        <p:style>
+          <a:lnRef idx="2">
+            <a:schemeClr val="accent1">
+              <a:shade val="50000"/>
+            </a:schemeClr>
+          </a:lnRef>
+          <a:fillRef idx="1">
+            <a:schemeClr val="accent1"/>
+          </a:fillRef>
+          <a:effectRef idx="0">
+            <a:schemeClr val="accent1"/>
+          </a:effectRef>
+          <a:fontRef idx="minor">
+            <a:schemeClr val="lt1"/>
+          </a:fontRef>
+        </p:style>
+        <p:txBody>
+          <a:bodyPr rtlCol="0" anchor="ctr"/>
+          <a:lstStyle/>
+          <a:p>
+            <a:pPr algn="ctr"/>
+            <a:endParaRPr lang="en-CA"/>
+          </a:p>
+        </p:txBody>
+      </p:sp>
+      <p:sp>
+        <p:nvSpPr>
+          <p:cNvPr id="53" name="Rectangle 52"/>
+          <p:cNvSpPr>
+            <a:spLocks/>
+          </p:cNvSpPr>
+          <p:nvPr/>
+        </p:nvSpPr>
+        <p:spPr>
+          <a:xfrm>
+            <a:off x="877119" y="2065166"/>
+            <a:ext cx="576072" cy="576072"/>
+          </a:xfrm>
+          <a:prstGeom prst="rect">
+            <a:avLst/>
+          </a:prstGeom>
+          <a:solidFill>
+            <a:schemeClr val="accent1">
+              <a:lumMod val="50000"/>
+            </a:schemeClr>
+          </a:solidFill>
+        </p:spPr>
+        <p:style>
+          <a:lnRef idx="2">
+            <a:schemeClr val="accent1">
+              <a:shade val="50000"/>
+            </a:schemeClr>
+          </a:lnRef>
+          <a:fillRef idx="1">
+            <a:schemeClr val="accent1"/>
+          </a:fillRef>
+          <a:effectRef idx="0">
+            <a:schemeClr val="accent1"/>
+          </a:effectRef>
+          <a:fontRef idx="minor">
+            <a:schemeClr val="lt1"/>
+          </a:fontRef>
+        </p:style>
+        <p:txBody>
+          <a:bodyPr rtlCol="0" anchor="ctr"/>
+          <a:lstStyle/>
+          <a:p>
+            <a:pPr algn="ctr"/>
+            <a:endParaRPr lang="en-CA"/>
+          </a:p>
+        </p:txBody>
+      </p:sp>
+      <p:sp>
+        <p:nvSpPr>
+          <p:cNvPr id="54" name="Rectangle 53"/>
+          <p:cNvSpPr/>
+          <p:nvPr/>
+        </p:nvSpPr>
+        <p:spPr>
+          <a:xfrm>
+            <a:off x="2492304" y="3537187"/>
+            <a:ext cx="579549" cy="579549"/>
+          </a:xfrm>
+          <a:prstGeom prst="rect">
+            <a:avLst/>
+          </a:prstGeom>
+        </p:spPr>
+        <p:style>
+          <a:lnRef idx="2">
+            <a:schemeClr val="accent1">
+              <a:shade val="50000"/>
+            </a:schemeClr>
+          </a:lnRef>
+          <a:fillRef idx="1">
+            <a:schemeClr val="accent1"/>
+          </a:fillRef>
+          <a:effectRef idx="0">
+            <a:schemeClr val="accent1"/>
+          </a:effectRef>
+          <a:fontRef idx="minor">
+            <a:schemeClr val="lt1"/>
+          </a:fontRef>
+        </p:style>
+        <p:txBody>
+          <a:bodyPr rtlCol="0" anchor="ctr"/>
+          <a:lstStyle/>
+          <a:p>
+            <a:pPr algn="ctr"/>
+            <a:endParaRPr lang="en-CA"/>
+          </a:p>
+        </p:txBody>
+      </p:sp>
+      <p:sp>
+        <p:nvSpPr>
+          <p:cNvPr id="55" name="Rectangle 54"/>
+          <p:cNvSpPr>
+            <a:spLocks noChangeAspect="1"/>
+          </p:cNvSpPr>
+          <p:nvPr/>
+        </p:nvSpPr>
+        <p:spPr>
+          <a:xfrm>
+            <a:off x="877118" y="3538925"/>
+            <a:ext cx="576072" cy="576072"/>
+          </a:xfrm>
+          <a:prstGeom prst="rect">
+            <a:avLst/>
+          </a:prstGeom>
+        </p:spPr>
+        <p:style>
+          <a:lnRef idx="2">
+            <a:schemeClr val="accent1">
+              <a:shade val="50000"/>
+            </a:schemeClr>
+          </a:lnRef>
+          <a:fillRef idx="1">
+            <a:schemeClr val="accent1"/>
+          </a:fillRef>
+          <a:effectRef idx="0">
+            <a:schemeClr val="accent1"/>
+          </a:effectRef>
+          <a:fontRef idx="minor">
+            <a:schemeClr val="lt1"/>
+          </a:fontRef>
+        </p:style>
+        <p:txBody>
+          <a:bodyPr rtlCol="0" anchor="ctr"/>
+          <a:lstStyle/>
+          <a:p>
+            <a:pPr algn="ctr"/>
+            <a:endParaRPr lang="en-CA"/>
+          </a:p>
+        </p:txBody>
+      </p:sp>
+      <p:sp>
+        <p:nvSpPr>
+          <p:cNvPr id="9" name="TextBox 8"/>
+          <p:cNvSpPr txBox="1"/>
+          <p:nvPr/>
+        </p:nvSpPr>
+        <p:spPr>
+          <a:xfrm rot="5085636">
+            <a:off x="5908196" y="2910767"/>
+            <a:ext cx="909031" cy="276999"/>
+          </a:xfrm>
+          <a:prstGeom prst="rect">
+            <a:avLst/>
+          </a:prstGeom>
+          <a:noFill/>
+        </p:spPr>
+        <p:txBody>
+          <a:bodyPr wrap="none" rtlCol="0">
+            <a:spAutoFit/>
+          </a:bodyPr>
+          <a:lstStyle/>
+          <a:p>
+            <a:r>
+              <a:rPr lang="en-CA" sz="1200" dirty="0" smtClean="0"/>
+              <a:t>Supervision</a:t>
+            </a:r>
+            <a:endParaRPr lang="en-CA" sz="1200" dirty="0"/>
+          </a:p>
+        </p:txBody>
+      </p:sp>
+      <p:sp>
+        <p:nvSpPr>
+          <p:cNvPr id="10" name="TextBox 9"/>
+          <p:cNvSpPr txBox="1"/>
+          <p:nvPr/>
+        </p:nvSpPr>
+        <p:spPr>
+          <a:xfrm rot="5400000">
+            <a:off x="3730486" y="2917313"/>
+            <a:ext cx="745717" cy="369332"/>
+          </a:xfrm>
+          <a:prstGeom prst="rect">
+            <a:avLst/>
+          </a:prstGeom>
+          <a:noFill/>
+        </p:spPr>
+        <p:txBody>
+          <a:bodyPr wrap="none" rtlCol="0">
+            <a:spAutoFit/>
+          </a:bodyPr>
+          <a:lstStyle/>
+          <a:p>
+            <a:r>
+              <a:rPr lang="en-CA" dirty="0" smtClean="0"/>
+              <a:t>Hiring</a:t>
+            </a:r>
+            <a:endParaRPr lang="en-CA" dirty="0"/>
+          </a:p>
+        </p:txBody>
+      </p:sp>
+      <p:cxnSp>
+        <p:nvCxnSpPr>
+          <p:cNvPr id="20" name="Elbow Connector 19"/>
+          <p:cNvCxnSpPr>
+            <a:stCxn id="55" idx="1"/>
+            <a:endCxn id="53" idx="1"/>
+          </p:cNvCxnSpPr>
+          <p:nvPr/>
+        </p:nvCxnSpPr>
+        <p:spPr>
+          <a:xfrm rot="10800000" flipH="1">
+            <a:off x="877117" y="2353203"/>
+            <a:ext cx="1" cy="1473759"/>
+          </a:xfrm>
+          <a:prstGeom prst="bentConnector3">
+            <a:avLst>
+              <a:gd name="adj1" fmla="val -22860000000"/>
+            </a:avLst>
+          </a:prstGeom>
+          <a:ln w="38100">
+            <a:solidFill>
+              <a:srgbClr val="FF0000"/>
+            </a:solidFill>
+            <a:tailEnd type="triangle"/>
+          </a:ln>
+        </p:spPr>
+        <p:style>
+          <a:lnRef idx="1">
+            <a:schemeClr val="accent1"/>
+          </a:lnRef>
+          <a:fillRef idx="0">
+            <a:schemeClr val="accent1"/>
+          </a:fillRef>
+          <a:effectRef idx="0">
+            <a:schemeClr val="accent1"/>
+          </a:effectRef>
+          <a:fontRef idx="minor">
+            <a:schemeClr val="tx1"/>
+          </a:fontRef>
+        </p:style>
+      </p:cxnSp>
+      <p:cxnSp>
+        <p:nvCxnSpPr>
+          <p:cNvPr id="22" name="Straight Arrow Connector 21"/>
+          <p:cNvCxnSpPr>
+            <a:stCxn id="53" idx="2"/>
+            <a:endCxn id="31" idx="1"/>
+          </p:cNvCxnSpPr>
+          <p:nvPr/>
+        </p:nvCxnSpPr>
+        <p:spPr>
+          <a:xfrm>
+            <a:off x="1165155" y="2641238"/>
+            <a:ext cx="579923" cy="958054"/>
+          </a:xfrm>
+          <a:prstGeom prst="straightConnector1">
+            <a:avLst/>
+          </a:prstGeom>
+          <a:ln w="38100">
+            <a:prstDash val="sysDash"/>
+            <a:tailEnd type="triangle"/>
+          </a:ln>
+        </p:spPr>
+        <p:style>
+          <a:lnRef idx="1">
+            <a:schemeClr val="accent1"/>
+          </a:lnRef>
+          <a:fillRef idx="0">
+            <a:schemeClr val="accent1"/>
+          </a:fillRef>
+          <a:effectRef idx="0">
+            <a:schemeClr val="accent1"/>
+          </a:effectRef>
+          <a:fontRef idx="minor">
+            <a:schemeClr val="tx1"/>
+          </a:fontRef>
+        </p:style>
+      </p:cxnSp>
+      <p:cxnSp>
+        <p:nvCxnSpPr>
+          <p:cNvPr id="24" name="Straight Arrow Connector 23"/>
+          <p:cNvCxnSpPr>
+            <a:stCxn id="52" idx="2"/>
+            <a:endCxn id="31" idx="0"/>
+          </p:cNvCxnSpPr>
+          <p:nvPr/>
+        </p:nvCxnSpPr>
+        <p:spPr>
+          <a:xfrm flipH="1">
+            <a:off x="1972747" y="2641238"/>
+            <a:ext cx="13706" cy="863751"/>
+          </a:xfrm>
+          <a:prstGeom prst="straightConnector1">
+            <a:avLst/>
+          </a:prstGeom>
+          <a:ln w="38100">
+            <a:prstDash val="sysDash"/>
+            <a:tailEnd type="triangle"/>
+          </a:ln>
+        </p:spPr>
+        <p:style>
+          <a:lnRef idx="1">
+            <a:schemeClr val="accent1"/>
+          </a:lnRef>
+          <a:fillRef idx="0">
+            <a:schemeClr val="accent1"/>
+          </a:fillRef>
+          <a:effectRef idx="0">
+            <a:schemeClr val="accent1"/>
+          </a:effectRef>
+          <a:fontRef idx="minor">
+            <a:schemeClr val="tx1"/>
+          </a:fontRef>
+        </p:style>
+      </p:cxnSp>
+      <p:cxnSp>
+        <p:nvCxnSpPr>
+          <p:cNvPr id="27" name="Straight Arrow Connector 26"/>
+          <p:cNvCxnSpPr/>
+          <p:nvPr/>
+        </p:nvCxnSpPr>
+        <p:spPr>
+          <a:xfrm>
+            <a:off x="2110485" y="4173776"/>
+            <a:ext cx="104388" cy="445184"/>
+          </a:xfrm>
+          <a:prstGeom prst="straightConnector1">
+            <a:avLst/>
+          </a:prstGeom>
+          <a:ln w="38100">
+            <a:solidFill>
+              <a:srgbClr val="FF0000"/>
+            </a:solidFill>
+            <a:tailEnd type="triangle"/>
+          </a:ln>
+        </p:spPr>
+        <p:style>
+          <a:lnRef idx="1">
+            <a:schemeClr val="accent1"/>
+          </a:lnRef>
+          <a:fillRef idx="0">
+            <a:schemeClr val="accent1"/>
+          </a:fillRef>
+          <a:effectRef idx="0">
+            <a:schemeClr val="accent1"/>
+          </a:effectRef>
+          <a:fontRef idx="minor">
+            <a:schemeClr val="tx1"/>
+          </a:fontRef>
+        </p:style>
+      </p:cxnSp>
+      <p:cxnSp>
+        <p:nvCxnSpPr>
+          <p:cNvPr id="30" name="Elbow Connector 29"/>
+          <p:cNvCxnSpPr>
+            <a:stCxn id="54" idx="3"/>
+            <a:endCxn id="51" idx="3"/>
+          </p:cNvCxnSpPr>
+          <p:nvPr/>
+        </p:nvCxnSpPr>
+        <p:spPr>
+          <a:xfrm flipV="1">
+            <a:off x="3071853" y="2353202"/>
+            <a:ext cx="23934" cy="1473760"/>
+          </a:xfrm>
+          <a:prstGeom prst="bentConnector3">
+            <a:avLst>
+              <a:gd name="adj1" fmla="val 1055127"/>
+            </a:avLst>
+          </a:prstGeom>
+          <a:ln w="38100">
+            <a:solidFill>
+              <a:srgbClr val="FF0000"/>
+            </a:solidFill>
+            <a:tailEnd type="triangle"/>
+          </a:ln>
+        </p:spPr>
+        <p:style>
+          <a:lnRef idx="1">
+            <a:schemeClr val="accent1"/>
+          </a:lnRef>
+          <a:fillRef idx="0">
+            <a:schemeClr val="accent1"/>
+          </a:fillRef>
+          <a:effectRef idx="0">
+            <a:schemeClr val="accent1"/>
+          </a:effectRef>
+          <a:fontRef idx="minor">
+            <a:schemeClr val="tx1"/>
+          </a:fontRef>
+        </p:style>
+      </p:cxnSp>
+      <p:cxnSp>
+        <p:nvCxnSpPr>
+          <p:cNvPr id="33" name="Straight Arrow Connector 32"/>
+          <p:cNvCxnSpPr>
+            <a:stCxn id="51" idx="2"/>
+            <a:endCxn id="54" idx="0"/>
+          </p:cNvCxnSpPr>
+          <p:nvPr/>
+        </p:nvCxnSpPr>
+        <p:spPr>
+          <a:xfrm flipH="1">
+            <a:off x="2782079" y="2641238"/>
+            <a:ext cx="25672" cy="895949"/>
+          </a:xfrm>
+          <a:prstGeom prst="straightConnector1">
+            <a:avLst/>
+          </a:prstGeom>
+          <a:ln w="38100">
+            <a:prstDash val="sysDash"/>
+            <a:tailEnd type="triangle"/>
+          </a:ln>
+        </p:spPr>
+        <p:style>
+          <a:lnRef idx="1">
+            <a:schemeClr val="accent1"/>
+          </a:lnRef>
+          <a:fillRef idx="0">
+            <a:schemeClr val="accent1"/>
+          </a:fillRef>
+          <a:effectRef idx="0">
+            <a:schemeClr val="accent1"/>
+          </a:effectRef>
+          <a:fontRef idx="minor">
+            <a:schemeClr val="tx1"/>
+          </a:fontRef>
+        </p:style>
+      </p:cxnSp>
+      <p:cxnSp>
+        <p:nvCxnSpPr>
+          <p:cNvPr id="46" name="Straight Arrow Connector 45"/>
+          <p:cNvCxnSpPr>
+            <a:stCxn id="53" idx="2"/>
+            <a:endCxn id="55" idx="0"/>
+          </p:cNvCxnSpPr>
+          <p:nvPr/>
+        </p:nvCxnSpPr>
+        <p:spPr>
+          <a:xfrm flipH="1">
+            <a:off x="1165154" y="2641238"/>
+            <a:ext cx="1" cy="897687"/>
+          </a:xfrm>
+          <a:prstGeom prst="straightConnector1">
+            <a:avLst/>
+          </a:prstGeom>
+          <a:ln w="38100">
+            <a:prstDash val="sysDash"/>
+            <a:tailEnd type="triangle"/>
+          </a:ln>
+        </p:spPr>
+        <p:style>
+          <a:lnRef idx="1">
+            <a:schemeClr val="accent1"/>
+          </a:lnRef>
+          <a:fillRef idx="0">
+            <a:schemeClr val="accent1"/>
+          </a:fillRef>
+          <a:effectRef idx="0">
+            <a:schemeClr val="accent1"/>
+          </a:effectRef>
+          <a:fontRef idx="minor">
+            <a:schemeClr val="tx1"/>
+          </a:fontRef>
+        </p:style>
+      </p:cxnSp>
+      <p:sp>
+        <p:nvSpPr>
+          <p:cNvPr id="82" name="Rectangle 81"/>
+          <p:cNvSpPr>
+            <a:spLocks noChangeAspect="1"/>
+          </p:cNvSpPr>
+          <p:nvPr/>
+        </p:nvSpPr>
+        <p:spPr>
+          <a:xfrm>
+            <a:off x="5912374" y="2065166"/>
+            <a:ext cx="576072" cy="576072"/>
+          </a:xfrm>
+          <a:prstGeom prst="rect">
+            <a:avLst/>
+          </a:prstGeom>
+          <a:solidFill>
+            <a:schemeClr val="accent1">
+              <a:lumMod val="50000"/>
+            </a:schemeClr>
+          </a:solidFill>
+        </p:spPr>
+        <p:style>
+          <a:lnRef idx="2">
+            <a:schemeClr val="accent1">
+              <a:shade val="50000"/>
+            </a:schemeClr>
+          </a:lnRef>
+          <a:fillRef idx="1">
+            <a:schemeClr val="accent1"/>
+          </a:fillRef>
+          <a:effectRef idx="0">
+            <a:schemeClr val="accent1"/>
+          </a:effectRef>
+          <a:fontRef idx="minor">
+            <a:schemeClr val="lt1"/>
+          </a:fontRef>
+        </p:style>
+        <p:txBody>
+          <a:bodyPr rtlCol="0" anchor="ctr"/>
+          <a:lstStyle/>
+          <a:p>
+            <a:pPr algn="ctr"/>
+            <a:endParaRPr lang="en-CA"/>
+          </a:p>
+        </p:txBody>
+      </p:sp>
+      <p:sp>
+        <p:nvSpPr>
+          <p:cNvPr id="86" name="Rectangle 85"/>
+          <p:cNvSpPr>
+            <a:spLocks noChangeAspect="1"/>
+          </p:cNvSpPr>
+          <p:nvPr/>
+        </p:nvSpPr>
+        <p:spPr>
+          <a:xfrm>
+            <a:off x="5028275" y="2065166"/>
+            <a:ext cx="576072" cy="576072"/>
+          </a:xfrm>
+          <a:prstGeom prst="rect">
+            <a:avLst/>
+          </a:prstGeom>
+          <a:solidFill>
+            <a:schemeClr val="accent1">
+              <a:lumMod val="50000"/>
+            </a:schemeClr>
+          </a:solidFill>
+        </p:spPr>
+        <p:style>
+          <a:lnRef idx="2">
+            <a:schemeClr val="accent1">
+              <a:shade val="50000"/>
+            </a:schemeClr>
+          </a:lnRef>
+          <a:fillRef idx="1">
+            <a:schemeClr val="accent1"/>
+          </a:fillRef>
+          <a:effectRef idx="0">
+            <a:schemeClr val="accent1"/>
+          </a:effectRef>
+          <a:fontRef idx="minor">
+            <a:schemeClr val="lt1"/>
+          </a:fontRef>
+        </p:style>
+        <p:txBody>
+          <a:bodyPr rtlCol="0" anchor="ctr"/>
+          <a:lstStyle/>
+          <a:p>
+            <a:pPr algn="ctr"/>
+            <a:endParaRPr lang="en-CA"/>
+          </a:p>
+        </p:txBody>
+      </p:sp>
+      <p:sp>
+        <p:nvSpPr>
+          <p:cNvPr id="87" name="Oval 86"/>
+          <p:cNvSpPr/>
+          <p:nvPr/>
+        </p:nvSpPr>
+        <p:spPr>
+          <a:xfrm>
+            <a:off x="4137289" y="2031230"/>
+            <a:ext cx="643944" cy="643944"/>
+          </a:xfrm>
+          <a:prstGeom prst="ellipse">
+            <a:avLst/>
+          </a:prstGeom>
+          <a:solidFill>
+            <a:schemeClr val="accent1">
+              <a:lumMod val="50000"/>
+            </a:schemeClr>
+          </a:solidFill>
+        </p:spPr>
+        <p:style>
+          <a:lnRef idx="2">
+            <a:schemeClr val="accent1">
+              <a:shade val="50000"/>
+            </a:schemeClr>
+          </a:lnRef>
+          <a:fillRef idx="1">
+            <a:schemeClr val="accent1"/>
+          </a:fillRef>
+          <a:effectRef idx="0">
+            <a:schemeClr val="accent1"/>
+          </a:effectRef>
+          <a:fontRef idx="minor">
+            <a:schemeClr val="lt1"/>
+          </a:fontRef>
+        </p:style>
+        <p:txBody>
+          <a:bodyPr rtlCol="0" anchor="ctr"/>
+          <a:lstStyle/>
+          <a:p>
+            <a:pPr algn="ctr"/>
+            <a:endParaRPr lang="en-CA"/>
+          </a:p>
+        </p:txBody>
+      </p:sp>
+      <p:sp>
+        <p:nvSpPr>
+          <p:cNvPr id="88" name="Rectangle 87"/>
+          <p:cNvSpPr>
+            <a:spLocks noChangeAspect="1"/>
+          </p:cNvSpPr>
+          <p:nvPr/>
+        </p:nvSpPr>
+        <p:spPr>
+          <a:xfrm>
+            <a:off x="9343754" y="2065166"/>
+            <a:ext cx="576072" cy="576072"/>
+          </a:xfrm>
+          <a:prstGeom prst="rect">
+            <a:avLst/>
+          </a:prstGeom>
+          <a:solidFill>
+            <a:schemeClr val="accent1">
+              <a:lumMod val="50000"/>
+            </a:schemeClr>
+          </a:solidFill>
+        </p:spPr>
+        <p:style>
+          <a:lnRef idx="2">
+            <a:schemeClr val="accent1">
+              <a:shade val="50000"/>
+            </a:schemeClr>
+          </a:lnRef>
+          <a:fillRef idx="1">
+            <a:schemeClr val="accent1"/>
+          </a:fillRef>
+          <a:effectRef idx="0">
+            <a:schemeClr val="accent1"/>
+          </a:effectRef>
+          <a:fontRef idx="minor">
+            <a:schemeClr val="lt1"/>
+          </a:fontRef>
+        </p:style>
+        <p:txBody>
+          <a:bodyPr rtlCol="0" anchor="ctr"/>
+          <a:lstStyle/>
+          <a:p>
+            <a:pPr algn="ctr"/>
+            <a:endParaRPr lang="en-CA"/>
+          </a:p>
+        </p:txBody>
+      </p:sp>
+      <p:sp>
+        <p:nvSpPr>
+          <p:cNvPr id="91" name="Oval 90"/>
+          <p:cNvSpPr/>
+          <p:nvPr/>
+        </p:nvSpPr>
+        <p:spPr>
+          <a:xfrm>
+            <a:off x="7626778" y="2031230"/>
+            <a:ext cx="643944" cy="643944"/>
+          </a:xfrm>
+          <a:prstGeom prst="ellipse">
+            <a:avLst/>
+          </a:prstGeom>
+          <a:solidFill>
+            <a:schemeClr val="accent1">
+              <a:lumMod val="50000"/>
+            </a:schemeClr>
+          </a:solidFill>
+        </p:spPr>
+        <p:style>
+          <a:lnRef idx="2">
+            <a:schemeClr val="accent1">
+              <a:shade val="50000"/>
+            </a:schemeClr>
+          </a:lnRef>
+          <a:fillRef idx="1">
+            <a:schemeClr val="accent1"/>
+          </a:fillRef>
+          <a:effectRef idx="0">
+            <a:schemeClr val="accent1"/>
+          </a:effectRef>
+          <a:fontRef idx="minor">
+            <a:schemeClr val="lt1"/>
+          </a:fontRef>
+        </p:style>
+        <p:txBody>
+          <a:bodyPr rtlCol="0" anchor="ctr"/>
+          <a:lstStyle/>
+          <a:p>
+            <a:pPr algn="ctr"/>
+            <a:endParaRPr lang="en-CA"/>
+          </a:p>
+        </p:txBody>
+      </p:sp>
+      <p:sp>
+        <p:nvSpPr>
+          <p:cNvPr id="93" name="Rectangle 92"/>
+          <p:cNvSpPr>
+            <a:spLocks noChangeAspect="1"/>
+          </p:cNvSpPr>
+          <p:nvPr/>
+        </p:nvSpPr>
+        <p:spPr>
+          <a:xfrm>
+            <a:off x="5131779" y="3538925"/>
+            <a:ext cx="576072" cy="576072"/>
+          </a:xfrm>
+          <a:prstGeom prst="rect">
+            <a:avLst/>
+          </a:prstGeom>
+        </p:spPr>
+        <p:style>
+          <a:lnRef idx="2">
+            <a:schemeClr val="accent1">
+              <a:shade val="50000"/>
+            </a:schemeClr>
+          </a:lnRef>
+          <a:fillRef idx="1">
+            <a:schemeClr val="accent1"/>
+          </a:fillRef>
+          <a:effectRef idx="0">
+            <a:schemeClr val="accent1"/>
+          </a:effectRef>
+          <a:fontRef idx="minor">
+            <a:schemeClr val="lt1"/>
+          </a:fontRef>
+        </p:style>
+        <p:txBody>
+          <a:bodyPr rtlCol="0" anchor="ctr"/>
+          <a:lstStyle/>
+          <a:p>
+            <a:pPr algn="ctr"/>
+            <a:endParaRPr lang="en-CA"/>
+          </a:p>
+        </p:txBody>
+      </p:sp>
+      <p:sp>
+        <p:nvSpPr>
+          <p:cNvPr id="94" name="Rectangle 93"/>
+          <p:cNvSpPr>
+            <a:spLocks noChangeAspect="1"/>
+          </p:cNvSpPr>
+          <p:nvPr/>
+        </p:nvSpPr>
+        <p:spPr>
+          <a:xfrm>
+            <a:off x="7643399" y="3538925"/>
+            <a:ext cx="576072" cy="576072"/>
+          </a:xfrm>
+          <a:prstGeom prst="rect">
+            <a:avLst/>
+          </a:prstGeom>
+        </p:spPr>
+        <p:style>
+          <a:lnRef idx="2">
+            <a:schemeClr val="accent1">
+              <a:shade val="50000"/>
+            </a:schemeClr>
+          </a:lnRef>
+          <a:fillRef idx="1">
+            <a:schemeClr val="accent1"/>
+          </a:fillRef>
+          <a:effectRef idx="0">
+            <a:schemeClr val="accent1"/>
+          </a:effectRef>
+          <a:fontRef idx="minor">
+            <a:schemeClr val="lt1"/>
+          </a:fontRef>
+        </p:style>
+        <p:txBody>
+          <a:bodyPr rtlCol="0" anchor="ctr"/>
+          <a:lstStyle/>
+          <a:p>
+            <a:pPr algn="ctr"/>
+            <a:endParaRPr lang="en-CA"/>
+          </a:p>
+        </p:txBody>
+      </p:sp>
+      <p:sp>
+        <p:nvSpPr>
+          <p:cNvPr id="96" name="Oval 95"/>
+          <p:cNvSpPr/>
+          <p:nvPr/>
+        </p:nvSpPr>
+        <p:spPr>
+          <a:xfrm>
+            <a:off x="8632514" y="3504989"/>
+            <a:ext cx="643944" cy="643944"/>
+          </a:xfrm>
+          <a:prstGeom prst="ellipse">
+            <a:avLst/>
+          </a:prstGeom>
+        </p:spPr>
+        <p:style>
+          <a:lnRef idx="2">
+            <a:schemeClr val="accent1">
+              <a:shade val="50000"/>
+            </a:schemeClr>
+          </a:lnRef>
+          <a:fillRef idx="1">
+            <a:schemeClr val="accent1"/>
+          </a:fillRef>
+          <a:effectRef idx="0">
+            <a:schemeClr val="accent1"/>
+          </a:effectRef>
+          <a:fontRef idx="minor">
+            <a:schemeClr val="lt1"/>
+          </a:fontRef>
+        </p:style>
+        <p:txBody>
+          <a:bodyPr rtlCol="0" anchor="ctr"/>
+          <a:lstStyle/>
+          <a:p>
+            <a:pPr algn="ctr"/>
+            <a:endParaRPr lang="en-CA"/>
+          </a:p>
+        </p:txBody>
+      </p:sp>
+      <p:sp>
+        <p:nvSpPr>
+          <p:cNvPr id="97" name="Rectangle 96"/>
+          <p:cNvSpPr>
+            <a:spLocks noChangeAspect="1"/>
+          </p:cNvSpPr>
+          <p:nvPr/>
+        </p:nvSpPr>
+        <p:spPr>
+          <a:xfrm>
+            <a:off x="5912374" y="3538925"/>
+            <a:ext cx="576072" cy="576072"/>
+          </a:xfrm>
+          <a:prstGeom prst="rect">
+            <a:avLst/>
+          </a:prstGeom>
+        </p:spPr>
+        <p:style>
+          <a:lnRef idx="2">
+            <a:schemeClr val="accent1">
+              <a:shade val="50000"/>
+            </a:schemeClr>
+          </a:lnRef>
+          <a:fillRef idx="1">
+            <a:schemeClr val="accent1"/>
+          </a:fillRef>
+          <a:effectRef idx="0">
+            <a:schemeClr val="accent1"/>
+          </a:effectRef>
+          <a:fontRef idx="minor">
+            <a:schemeClr val="lt1"/>
+          </a:fontRef>
+        </p:style>
+        <p:txBody>
+          <a:bodyPr rtlCol="0" anchor="ctr"/>
+          <a:lstStyle/>
+          <a:p>
+            <a:pPr algn="ctr"/>
+            <a:endParaRPr lang="en-CA"/>
+          </a:p>
+        </p:txBody>
+      </p:sp>
+      <p:sp>
+        <p:nvSpPr>
+          <p:cNvPr id="98" name="TextBox 97"/>
+          <p:cNvSpPr txBox="1"/>
+          <p:nvPr/>
+        </p:nvSpPr>
+        <p:spPr>
+          <a:xfrm rot="4251696">
+            <a:off x="9310027" y="2910766"/>
+            <a:ext cx="909031" cy="276999"/>
+          </a:xfrm>
+          <a:prstGeom prst="rect">
+            <a:avLst/>
+          </a:prstGeom>
+          <a:noFill/>
+        </p:spPr>
+        <p:txBody>
+          <a:bodyPr wrap="none" rtlCol="0">
+            <a:spAutoFit/>
+          </a:bodyPr>
+          <a:lstStyle/>
+          <a:p>
+            <a:r>
+              <a:rPr lang="en-CA" sz="1200" dirty="0" smtClean="0"/>
+              <a:t>Supervision</a:t>
+            </a:r>
+            <a:endParaRPr lang="en-CA" sz="1200" dirty="0"/>
+          </a:p>
+        </p:txBody>
+      </p:sp>
+      <p:sp>
+        <p:nvSpPr>
+          <p:cNvPr id="99" name="TextBox 98"/>
+          <p:cNvSpPr txBox="1"/>
+          <p:nvPr/>
+        </p:nvSpPr>
+        <p:spPr>
+          <a:xfrm rot="5400000">
+            <a:off x="436267" y="2917313"/>
+            <a:ext cx="745717" cy="369332"/>
+          </a:xfrm>
+          <a:prstGeom prst="rect">
+            <a:avLst/>
+          </a:prstGeom>
+          <a:noFill/>
+        </p:spPr>
+        <p:txBody>
+          <a:bodyPr wrap="none" rtlCol="0">
+            <a:spAutoFit/>
+          </a:bodyPr>
+          <a:lstStyle/>
+          <a:p>
+            <a:r>
+              <a:rPr lang="en-CA" dirty="0" smtClean="0"/>
+              <a:t>Hiring</a:t>
+            </a:r>
+            <a:endParaRPr lang="en-CA" dirty="0"/>
+          </a:p>
+        </p:txBody>
+      </p:sp>
+      <p:sp>
+        <p:nvSpPr>
+          <p:cNvPr id="49" name="TextBox 48"/>
+          <p:cNvSpPr txBox="1"/>
+          <p:nvPr/>
+        </p:nvSpPr>
+        <p:spPr>
+          <a:xfrm rot="18000000">
+            <a:off x="737182" y="1300752"/>
+            <a:ext cx="1255472" cy="369332"/>
+          </a:xfrm>
+          <a:prstGeom prst="rect">
+            <a:avLst/>
+          </a:prstGeom>
+          <a:noFill/>
+        </p:spPr>
+        <p:txBody>
+          <a:bodyPr wrap="none" rtlCol="0">
+            <a:spAutoFit/>
+          </a:bodyPr>
+          <a:lstStyle/>
+          <a:p>
+            <a:r>
+              <a:rPr lang="en-CA" dirty="0" smtClean="0"/>
+              <a:t>Discipline 1</a:t>
+            </a:r>
+            <a:endParaRPr lang="en-CA" dirty="0"/>
+          </a:p>
+        </p:txBody>
+      </p:sp>
+      <p:sp>
+        <p:nvSpPr>
+          <p:cNvPr id="100" name="TextBox 99"/>
+          <p:cNvSpPr txBox="1"/>
+          <p:nvPr/>
+        </p:nvSpPr>
+        <p:spPr>
+          <a:xfrm rot="18000000">
+            <a:off x="1570487" y="1300752"/>
+            <a:ext cx="1255472" cy="369332"/>
+          </a:xfrm>
+          <a:prstGeom prst="rect">
+            <a:avLst/>
+          </a:prstGeom>
+          <a:noFill/>
+        </p:spPr>
+        <p:txBody>
+          <a:bodyPr wrap="none" rtlCol="0">
+            <a:spAutoFit/>
+          </a:bodyPr>
+          <a:lstStyle/>
+          <a:p>
+            <a:r>
+              <a:rPr lang="en-CA" dirty="0" smtClean="0"/>
+              <a:t>Discipline 2</a:t>
+            </a:r>
+            <a:endParaRPr lang="en-CA" dirty="0"/>
+          </a:p>
+        </p:txBody>
+      </p:sp>
+      <p:sp>
+        <p:nvSpPr>
+          <p:cNvPr id="101" name="TextBox 100"/>
+          <p:cNvSpPr txBox="1"/>
+          <p:nvPr/>
+        </p:nvSpPr>
+        <p:spPr>
+          <a:xfrm rot="18000000">
+            <a:off x="2403791" y="1300752"/>
+            <a:ext cx="1255472" cy="369332"/>
+          </a:xfrm>
+          <a:prstGeom prst="rect">
+            <a:avLst/>
+          </a:prstGeom>
+          <a:noFill/>
+        </p:spPr>
+        <p:txBody>
+          <a:bodyPr wrap="none" rtlCol="0">
+            <a:spAutoFit/>
+          </a:bodyPr>
+          <a:lstStyle/>
+          <a:p>
+            <a:r>
+              <a:rPr lang="en-CA" dirty="0" smtClean="0"/>
+              <a:t>Discipline 3</a:t>
+            </a:r>
+            <a:endParaRPr lang="en-CA" dirty="0"/>
+          </a:p>
+        </p:txBody>
+      </p:sp>
+      <p:sp>
+        <p:nvSpPr>
+          <p:cNvPr id="102" name="TextBox 101"/>
+          <p:cNvSpPr txBox="1"/>
+          <p:nvPr/>
+        </p:nvSpPr>
+        <p:spPr>
+          <a:xfrm rot="18000000">
+            <a:off x="4091952" y="1227105"/>
+            <a:ext cx="1223668" cy="369332"/>
+          </a:xfrm>
+          <a:prstGeom prst="rect">
+            <a:avLst/>
+          </a:prstGeom>
+          <a:noFill/>
+        </p:spPr>
+        <p:txBody>
+          <a:bodyPr wrap="none" rtlCol="0">
+            <a:spAutoFit/>
+          </a:bodyPr>
+          <a:lstStyle/>
+          <a:p>
+            <a:r>
+              <a:rPr lang="en-CA" dirty="0" err="1" smtClean="0"/>
+              <a:t>Interdiscip</a:t>
+            </a:r>
+            <a:r>
+              <a:rPr lang="en-CA" dirty="0" smtClean="0"/>
+              <a:t>.</a:t>
+            </a:r>
+            <a:endParaRPr lang="en-CA" dirty="0"/>
+          </a:p>
+        </p:txBody>
+      </p:sp>
+      <p:sp>
+        <p:nvSpPr>
+          <p:cNvPr id="103" name="TextBox 102"/>
+          <p:cNvSpPr txBox="1"/>
+          <p:nvPr/>
+        </p:nvSpPr>
+        <p:spPr>
+          <a:xfrm rot="18000000">
+            <a:off x="4909351" y="1227105"/>
+            <a:ext cx="1255472" cy="369332"/>
+          </a:xfrm>
+          <a:prstGeom prst="rect">
+            <a:avLst/>
+          </a:prstGeom>
+          <a:noFill/>
+        </p:spPr>
+        <p:txBody>
+          <a:bodyPr wrap="none" rtlCol="0">
+            <a:spAutoFit/>
+          </a:bodyPr>
+          <a:lstStyle/>
+          <a:p>
+            <a:r>
+              <a:rPr lang="en-CA" smtClean="0"/>
+              <a:t>Discipline 2</a:t>
+            </a:r>
+            <a:endParaRPr lang="en-CA" dirty="0"/>
+          </a:p>
+        </p:txBody>
+      </p:sp>
+      <p:sp>
+        <p:nvSpPr>
+          <p:cNvPr id="104" name="TextBox 103"/>
+          <p:cNvSpPr txBox="1"/>
+          <p:nvPr/>
+        </p:nvSpPr>
+        <p:spPr>
+          <a:xfrm rot="18000000">
+            <a:off x="5742655" y="1227105"/>
+            <a:ext cx="1255472" cy="369332"/>
+          </a:xfrm>
+          <a:prstGeom prst="rect">
+            <a:avLst/>
+          </a:prstGeom>
+          <a:noFill/>
+        </p:spPr>
+        <p:txBody>
+          <a:bodyPr wrap="none" rtlCol="0">
+            <a:spAutoFit/>
+          </a:bodyPr>
+          <a:lstStyle/>
+          <a:p>
+            <a:r>
+              <a:rPr lang="en-CA" smtClean="0"/>
+              <a:t>Discipline 3</a:t>
+            </a:r>
+            <a:endParaRPr lang="en-CA" dirty="0"/>
+          </a:p>
+        </p:txBody>
+      </p:sp>
+      <p:sp>
+        <p:nvSpPr>
+          <p:cNvPr id="105" name="TextBox 104"/>
+          <p:cNvSpPr txBox="1"/>
+          <p:nvPr/>
+        </p:nvSpPr>
+        <p:spPr>
+          <a:xfrm rot="18000000">
+            <a:off x="7539108" y="1224251"/>
+            <a:ext cx="1223668" cy="369332"/>
+          </a:xfrm>
+          <a:prstGeom prst="rect">
+            <a:avLst/>
+          </a:prstGeom>
+          <a:noFill/>
+        </p:spPr>
+        <p:txBody>
+          <a:bodyPr wrap="none" rtlCol="0">
+            <a:spAutoFit/>
+          </a:bodyPr>
+          <a:lstStyle/>
+          <a:p>
+            <a:r>
+              <a:rPr lang="en-CA" dirty="0" err="1" smtClean="0"/>
+              <a:t>Interdiscip</a:t>
+            </a:r>
+            <a:r>
+              <a:rPr lang="en-CA" dirty="0" smtClean="0"/>
+              <a:t>.</a:t>
+            </a:r>
+            <a:endParaRPr lang="en-CA" dirty="0"/>
+          </a:p>
+        </p:txBody>
+      </p:sp>
+      <p:sp>
+        <p:nvSpPr>
+          <p:cNvPr id="106" name="TextBox 105"/>
+          <p:cNvSpPr txBox="1"/>
+          <p:nvPr/>
+        </p:nvSpPr>
+        <p:spPr>
+          <a:xfrm rot="18000000">
+            <a:off x="8356508" y="1224251"/>
+            <a:ext cx="1255472" cy="369332"/>
+          </a:xfrm>
+          <a:prstGeom prst="rect">
+            <a:avLst/>
+          </a:prstGeom>
+          <a:noFill/>
+        </p:spPr>
+        <p:txBody>
+          <a:bodyPr wrap="none" rtlCol="0">
+            <a:spAutoFit/>
+          </a:bodyPr>
+          <a:lstStyle/>
+          <a:p>
+            <a:r>
+              <a:rPr lang="en-CA" smtClean="0"/>
+              <a:t>Discipline 2</a:t>
+            </a:r>
+            <a:endParaRPr lang="en-CA" dirty="0"/>
+          </a:p>
+        </p:txBody>
+      </p:sp>
+      <p:sp>
+        <p:nvSpPr>
+          <p:cNvPr id="107" name="TextBox 106"/>
+          <p:cNvSpPr txBox="1"/>
+          <p:nvPr/>
+        </p:nvSpPr>
+        <p:spPr>
+          <a:xfrm rot="18000000">
+            <a:off x="9189812" y="1224251"/>
+            <a:ext cx="1255472" cy="369332"/>
+          </a:xfrm>
+          <a:prstGeom prst="rect">
+            <a:avLst/>
+          </a:prstGeom>
+          <a:noFill/>
+        </p:spPr>
+        <p:txBody>
+          <a:bodyPr wrap="none" rtlCol="0">
+            <a:spAutoFit/>
+          </a:bodyPr>
+          <a:lstStyle/>
+          <a:p>
+            <a:r>
+              <a:rPr lang="en-CA" smtClean="0"/>
+              <a:t>Discipline 3</a:t>
+            </a:r>
+            <a:endParaRPr lang="en-CA" dirty="0"/>
+          </a:p>
+        </p:txBody>
+      </p:sp>
+      <p:sp>
+        <p:nvSpPr>
+          <p:cNvPr id="108" name="TextBox 107"/>
+          <p:cNvSpPr txBox="1"/>
+          <p:nvPr/>
+        </p:nvSpPr>
+        <p:spPr>
+          <a:xfrm rot="5400000">
+            <a:off x="7203468" y="2917313"/>
+            <a:ext cx="745717" cy="369332"/>
+          </a:xfrm>
+          <a:prstGeom prst="rect">
+            <a:avLst/>
+          </a:prstGeom>
+          <a:noFill/>
+        </p:spPr>
+        <p:txBody>
+          <a:bodyPr wrap="none" rtlCol="0">
+            <a:spAutoFit/>
+          </a:bodyPr>
+          <a:lstStyle/>
+          <a:p>
+            <a:r>
+              <a:rPr lang="en-CA" dirty="0" smtClean="0"/>
+              <a:t>Hiring</a:t>
+            </a:r>
+            <a:endParaRPr lang="en-CA" dirty="0"/>
+          </a:p>
+        </p:txBody>
+      </p:sp>
+      <p:sp>
+        <p:nvSpPr>
+          <p:cNvPr id="109" name="Rectangle 108"/>
+          <p:cNvSpPr>
+            <a:spLocks noChangeAspect="1"/>
+          </p:cNvSpPr>
+          <p:nvPr/>
+        </p:nvSpPr>
+        <p:spPr>
+          <a:xfrm>
+            <a:off x="8488872" y="2065166"/>
+            <a:ext cx="576072" cy="576072"/>
+          </a:xfrm>
+          <a:prstGeom prst="rect">
+            <a:avLst/>
+          </a:prstGeom>
+          <a:solidFill>
+            <a:schemeClr val="accent1">
+              <a:lumMod val="50000"/>
+            </a:schemeClr>
+          </a:solidFill>
+        </p:spPr>
+        <p:style>
+          <a:lnRef idx="2">
+            <a:schemeClr val="accent1">
+              <a:shade val="50000"/>
+            </a:schemeClr>
+          </a:lnRef>
+          <a:fillRef idx="1">
+            <a:schemeClr val="accent1"/>
+          </a:fillRef>
+          <a:effectRef idx="0">
+            <a:schemeClr val="accent1"/>
+          </a:effectRef>
+          <a:fontRef idx="minor">
+            <a:schemeClr val="lt1"/>
+          </a:fontRef>
+        </p:style>
+        <p:txBody>
+          <a:bodyPr rtlCol="0" anchor="ctr"/>
+          <a:lstStyle/>
+          <a:p>
+            <a:pPr algn="ctr"/>
+            <a:endParaRPr lang="en-CA"/>
           </a:p>
         </p:txBody>
       </p:sp>

</xml_diff>